<commit_message>
Commiting changes made a couple months ago...
</commit_message>
<xml_diff>
--- a/case1.pptx
+++ b/case1.pptx
@@ -5,17 +5,25 @@
     <p:sldMasterId id="2147483705" r:id="rId1"/>
   </p:sldMasterIdLst>
   <p:notesMasterIdLst>
-    <p:notesMasterId r:id="rId10"/>
+    <p:notesMasterId r:id="rId18"/>
   </p:notesMasterIdLst>
   <p:sldIdLst>
     <p:sldId id="256" r:id="rId2"/>
     <p:sldId id="257" r:id="rId3"/>
     <p:sldId id="258" r:id="rId4"/>
     <p:sldId id="259" r:id="rId5"/>
-    <p:sldId id="260" r:id="rId6"/>
-    <p:sldId id="262" r:id="rId7"/>
-    <p:sldId id="263" r:id="rId8"/>
-    <p:sldId id="261" r:id="rId9"/>
+    <p:sldId id="264" r:id="rId6"/>
+    <p:sldId id="267" r:id="rId7"/>
+    <p:sldId id="265" r:id="rId8"/>
+    <p:sldId id="266" r:id="rId9"/>
+    <p:sldId id="268" r:id="rId10"/>
+    <p:sldId id="260" r:id="rId11"/>
+    <p:sldId id="261" r:id="rId12"/>
+    <p:sldId id="269" r:id="rId13"/>
+    <p:sldId id="270" r:id="rId14"/>
+    <p:sldId id="271" r:id="rId15"/>
+    <p:sldId id="272" r:id="rId16"/>
+    <p:sldId id="273" r:id="rId17"/>
   </p:sldIdLst>
   <p:sldSz cx="12192000" cy="6858000"/>
   <p:notesSz cx="6858000" cy="9144000"/>
@@ -116,7 +124,18 @@
   </p:defaultTextStyle>
   <p:extLst>
     <p:ext uri="{EFAFB233-063F-42B5-8137-9DF3F51BA10A}">
-      <p15:sldGuideLst xmlns:p15="http://schemas.microsoft.com/office/powerpoint/2012/main" xmlns=""/>
+      <p15:sldGuideLst xmlns:p15="http://schemas.microsoft.com/office/powerpoint/2012/main" xmlns="">
+        <p15:guide id="1" orient="horz" pos="2160">
+          <p15:clr>
+            <a:srgbClr val="A4A3A4"/>
+          </p15:clr>
+        </p15:guide>
+        <p15:guide id="2" pos="3840">
+          <p15:clr>
+            <a:srgbClr val="A4A3A4"/>
+          </p15:clr>
+        </p15:guide>
+      </p15:sldGuideLst>
     </p:ext>
   </p:extLst>
 </p:presentation>
@@ -204,7 +223,7 @@
           <a:p>
             <a:fld id="{D4E5F68D-220C-4FE1-AB55-4B69C76E02B6}" type="datetimeFigureOut">
               <a:rPr lang="en-US" smtClean="0"/>
-              <a:t>6/22/2016</a:t>
+              <a:t>6/28/2016</a:t>
             </a:fld>
             <a:endParaRPr lang="en-US"/>
           </a:p>
@@ -471,6 +490,90 @@
 </p:notesMaster>
 </file>
 
+<file path=ppt/notesSlides/notesSlide1.xml><?xml version="1.0" encoding="utf-8"?>
+<p:notes xmlns:a="http://schemas.openxmlformats.org/drawingml/2006/main" xmlns:r="http://schemas.openxmlformats.org/officeDocument/2006/relationships" xmlns:p="http://schemas.openxmlformats.org/presentationml/2006/main">
+  <p:cSld>
+    <p:spTree>
+      <p:nvGrpSpPr>
+        <p:cNvPr id="1" name=""/>
+        <p:cNvGrpSpPr/>
+        <p:nvPr/>
+      </p:nvGrpSpPr>
+      <p:grpSpPr>
+        <a:xfrm>
+          <a:off x="0" y="0"/>
+          <a:ext cx="0" cy="0"/>
+          <a:chOff x="0" y="0"/>
+          <a:chExt cx="0" cy="0"/>
+        </a:xfrm>
+      </p:grpSpPr>
+      <p:sp>
+        <p:nvSpPr>
+          <p:cNvPr id="2" name="Slide Image Placeholder 1"/>
+          <p:cNvSpPr>
+            <a:spLocks noGrp="1" noRot="1" noChangeAspect="1"/>
+          </p:cNvSpPr>
+          <p:nvPr>
+            <p:ph type="sldImg"/>
+          </p:nvPr>
+        </p:nvSpPr>
+        <p:spPr/>
+      </p:sp>
+      <p:sp>
+        <p:nvSpPr>
+          <p:cNvPr id="3" name="Notes Placeholder 2"/>
+          <p:cNvSpPr>
+            <a:spLocks noGrp="1"/>
+          </p:cNvSpPr>
+          <p:nvPr>
+            <p:ph type="body" idx="1"/>
+          </p:nvPr>
+        </p:nvSpPr>
+        <p:spPr/>
+        <p:txBody>
+          <a:bodyPr/>
+          <a:lstStyle/>
+          <a:p>
+            <a:endParaRPr lang="en-US" dirty="0"/>
+          </a:p>
+        </p:txBody>
+      </p:sp>
+      <p:sp>
+        <p:nvSpPr>
+          <p:cNvPr id="4" name="Slide Number Placeholder 3"/>
+          <p:cNvSpPr>
+            <a:spLocks noGrp="1"/>
+          </p:cNvSpPr>
+          <p:nvPr>
+            <p:ph type="sldNum" sz="quarter" idx="10"/>
+          </p:nvPr>
+        </p:nvSpPr>
+        <p:spPr/>
+        <p:txBody>
+          <a:bodyPr/>
+          <a:lstStyle/>
+          <a:p>
+            <a:fld id="{C85C0C4C-6DE7-4C30-A614-7C3F3C58E71A}" type="slidenum">
+              <a:rPr lang="en-US" smtClean="0"/>
+              <a:t>5</a:t>
+            </a:fld>
+            <a:endParaRPr lang="en-US"/>
+          </a:p>
+        </p:txBody>
+      </p:sp>
+    </p:spTree>
+    <p:extLst>
+      <p:ext uri="{BB962C8B-B14F-4D97-AF65-F5344CB8AC3E}">
+        <p14:creationId xmlns:p14="http://schemas.microsoft.com/office/powerpoint/2010/main" val="81424425"/>
+      </p:ext>
+    </p:extLst>
+  </p:cSld>
+  <p:clrMapOvr>
+    <a:masterClrMapping/>
+  </p:clrMapOvr>
+</p:notes>
+</file>
+
 <file path=ppt/slideLayouts/slideLayout1.xml><?xml version="1.0" encoding="utf-8"?>
 <p:sldLayout xmlns:a="http://schemas.openxmlformats.org/drawingml/2006/main" xmlns:r="http://schemas.openxmlformats.org/officeDocument/2006/relationships" xmlns:p="http://schemas.openxmlformats.org/presentationml/2006/main" type="title" preserve="1">
   <p:cSld name="Title Slide">
@@ -701,7 +804,7 @@
             <a:fld id="{B61BEF0D-F0BB-DE4B-95CE-6DB70DBA9567}" type="datetimeFigureOut">
               <a:rPr lang="en-US" smtClean="0"/>
               <a:pPr/>
-              <a:t>6/22/2016</a:t>
+              <a:t>6/28/2016</a:t>
             </a:fld>
             <a:endParaRPr lang="en-US" dirty="0"/>
           </a:p>
@@ -1037,7 +1140,7 @@
             <a:fld id="{B61BEF0D-F0BB-DE4B-95CE-6DB70DBA9567}" type="datetimeFigureOut">
               <a:rPr lang="en-US" smtClean="0"/>
               <a:pPr/>
-              <a:t>6/22/2016</a:t>
+              <a:t>6/28/2016</a:t>
             </a:fld>
             <a:endParaRPr lang="en-US" dirty="0"/>
           </a:p>
@@ -1317,7 +1420,7 @@
             <a:fld id="{B61BEF0D-F0BB-DE4B-95CE-6DB70DBA9567}" type="datetimeFigureOut">
               <a:rPr lang="en-US" smtClean="0"/>
               <a:pPr/>
-              <a:t>6/22/2016</a:t>
+              <a:t>6/28/2016</a:t>
             </a:fld>
             <a:endParaRPr lang="en-US" dirty="0"/>
           </a:p>
@@ -1887,7 +1990,7 @@
             <a:fld id="{B61BEF0D-F0BB-DE4B-95CE-6DB70DBA9567}" type="datetimeFigureOut">
               <a:rPr lang="en-US" smtClean="0"/>
               <a:pPr/>
-              <a:t>6/22/2016</a:t>
+              <a:t>6/28/2016</a:t>
             </a:fld>
             <a:endParaRPr lang="en-US" dirty="0"/>
           </a:p>
@@ -2167,7 +2270,7 @@
             <a:fld id="{B61BEF0D-F0BB-DE4B-95CE-6DB70DBA9567}" type="datetimeFigureOut">
               <a:rPr lang="en-US" smtClean="0"/>
               <a:pPr/>
-              <a:t>6/22/2016</a:t>
+              <a:t>6/28/2016</a:t>
             </a:fld>
             <a:endParaRPr lang="en-US" dirty="0"/>
           </a:p>
@@ -2731,7 +2834,7 @@
             <a:fld id="{B61BEF0D-F0BB-DE4B-95CE-6DB70DBA9567}" type="datetimeFigureOut">
               <a:rPr lang="en-US" smtClean="0"/>
               <a:pPr/>
-              <a:t>6/22/2016</a:t>
+              <a:t>6/28/2016</a:t>
             </a:fld>
             <a:endParaRPr lang="en-US" dirty="0"/>
           </a:p>
@@ -3060,7 +3163,7 @@
             <a:fld id="{B61BEF0D-F0BB-DE4B-95CE-6DB70DBA9567}" type="datetimeFigureOut">
               <a:rPr lang="en-US" smtClean="0"/>
               <a:pPr/>
-              <a:t>6/22/2016</a:t>
+              <a:t>6/28/2016</a:t>
             </a:fld>
             <a:endParaRPr lang="en-US" dirty="0"/>
           </a:p>
@@ -3267,7 +3370,7 @@
             <a:fld id="{B61BEF0D-F0BB-DE4B-95CE-6DB70DBA9567}" type="datetimeFigureOut">
               <a:rPr lang="en-US" smtClean="0"/>
               <a:pPr/>
-              <a:t>6/22/2016</a:t>
+              <a:t>6/28/2016</a:t>
             </a:fld>
             <a:endParaRPr lang="en-US" dirty="0"/>
           </a:p>
@@ -3479,7 +3582,7 @@
             <a:fld id="{B61BEF0D-F0BB-DE4B-95CE-6DB70DBA9567}" type="datetimeFigureOut">
               <a:rPr lang="en-US" smtClean="0"/>
               <a:pPr/>
-              <a:t>6/22/2016</a:t>
+              <a:t>6/28/2016</a:t>
             </a:fld>
             <a:endParaRPr lang="en-US" dirty="0"/>
           </a:p>
@@ -3626,7 +3729,7 @@
         </p:nvSpPr>
         <p:spPr/>
         <p:txBody>
-          <a:bodyPr anchor="ctr"/>
+          <a:bodyPr anchor="t"/>
           <a:lstStyle/>
           <a:p>
             <a:pPr lvl="0"/>
@@ -3684,7 +3787,7 @@
             <a:fld id="{B61BEF0D-F0BB-DE4B-95CE-6DB70DBA9567}" type="datetimeFigureOut">
               <a:rPr lang="en-US" smtClean="0"/>
               <a:pPr/>
-              <a:t>6/22/2016</a:t>
+              <a:t>6/28/2016</a:t>
             </a:fld>
             <a:endParaRPr lang="en-US" dirty="0"/>
           </a:p>
@@ -3962,7 +4065,7 @@
             <a:fld id="{B61BEF0D-F0BB-DE4B-95CE-6DB70DBA9567}" type="datetimeFigureOut">
               <a:rPr lang="en-US" smtClean="0"/>
               <a:pPr/>
-              <a:t>6/22/2016</a:t>
+              <a:t>6/28/2016</a:t>
             </a:fld>
             <a:endParaRPr lang="en-US" dirty="0"/>
           </a:p>
@@ -4233,7 +4336,7 @@
             <a:fld id="{B61BEF0D-F0BB-DE4B-95CE-6DB70DBA9567}" type="datetimeFigureOut">
               <a:rPr lang="en-US" smtClean="0"/>
               <a:pPr/>
-              <a:t>6/22/2016</a:t>
+              <a:t>6/28/2016</a:t>
             </a:fld>
             <a:endParaRPr lang="en-US" dirty="0"/>
           </a:p>
@@ -4608,7 +4711,7 @@
             <a:fld id="{B61BEF0D-F0BB-DE4B-95CE-6DB70DBA9567}" type="datetimeFigureOut">
               <a:rPr lang="en-US" smtClean="0"/>
               <a:pPr/>
-              <a:t>6/22/2016</a:t>
+              <a:t>6/28/2016</a:t>
             </a:fld>
             <a:endParaRPr lang="en-US" dirty="0"/>
           </a:p>
@@ -4761,7 +4864,7 @@
             <a:fld id="{B61BEF0D-F0BB-DE4B-95CE-6DB70DBA9567}" type="datetimeFigureOut">
               <a:rPr lang="en-US" smtClean="0"/>
               <a:pPr/>
-              <a:t>6/22/2016</a:t>
+              <a:t>6/28/2016</a:t>
             </a:fld>
             <a:endParaRPr lang="en-US" dirty="0"/>
           </a:p>
@@ -4888,7 +4991,7 @@
             <a:fld id="{B61BEF0D-F0BB-DE4B-95CE-6DB70DBA9567}" type="datetimeFigureOut">
               <a:rPr lang="en-US" smtClean="0"/>
               <a:pPr/>
-              <a:t>6/22/2016</a:t>
+              <a:t>6/28/2016</a:t>
             </a:fld>
             <a:endParaRPr lang="en-US" dirty="0"/>
           </a:p>
@@ -5175,7 +5278,7 @@
             <a:fld id="{B61BEF0D-F0BB-DE4B-95CE-6DB70DBA9567}" type="datetimeFigureOut">
               <a:rPr lang="en-US" smtClean="0"/>
               <a:pPr/>
-              <a:t>6/22/2016</a:t>
+              <a:t>6/28/2016</a:t>
             </a:fld>
             <a:endParaRPr lang="en-US" dirty="0"/>
           </a:p>
@@ -5501,7 +5604,7 @@
             <a:fld id="{B61BEF0D-F0BB-DE4B-95CE-6DB70DBA9567}" type="datetimeFigureOut">
               <a:rPr lang="en-US" smtClean="0"/>
               <a:pPr/>
-              <a:t>6/22/2016</a:t>
+              <a:t>6/28/2016</a:t>
             </a:fld>
             <a:endParaRPr lang="en-US" dirty="0"/>
           </a:p>
@@ -5717,7 +5820,7 @@
             <a:fld id="{B61BEF0D-F0BB-DE4B-95CE-6DB70DBA9567}" type="datetimeFigureOut">
               <a:rPr lang="en-US" smtClean="0"/>
               <a:pPr/>
-              <a:t>6/22/2016</a:t>
+              <a:t>6/28/2016</a:t>
             </a:fld>
             <a:endParaRPr lang="en-US" dirty="0"/>
           </a:p>
@@ -6247,10 +6350,9 @@
           <a:lstStyle/>
           <a:p>
             <a:r>
-              <a:rPr lang="en-US" dirty="0" smtClean="0"/>
+              <a:rPr lang="en-US" dirty="0"/>
               <a:t>Lesson 1 Case 1</a:t>
             </a:r>
-            <a:endParaRPr lang="en-US" dirty="0"/>
           </a:p>
         </p:txBody>
       </p:sp>
@@ -6270,18 +6372,17 @@
           <a:lstStyle/>
           <a:p>
             <a:r>
-              <a:rPr lang="en-US" dirty="0" smtClean="0"/>
+              <a:rPr lang="en-US" dirty="0"/>
               <a:t>Node </a:t>
             </a:r>
             <a:r>
-              <a:rPr lang="en-US" dirty="0" err="1" smtClean="0"/>
+              <a:rPr lang="en-US" dirty="0" err="1"/>
               <a:t>FileSystem</a:t>
             </a:r>
             <a:r>
-              <a:rPr lang="en-US" dirty="0" smtClean="0"/>
+              <a:rPr lang="en-US" dirty="0"/>
               <a:t> - csv</a:t>
             </a:r>
-            <a:endParaRPr lang="en-US" dirty="0"/>
           </a:p>
         </p:txBody>
       </p:sp>
@@ -6298,7 +6399,7 @@
 </p:sld>
 </file>
 
-<file path=ppt/slides/slide2.xml><?xml version="1.0" encoding="utf-8"?>
+<file path=ppt/slides/slide10.xml><?xml version="1.0" encoding="utf-8"?>
 <p:sld xmlns:a="http://schemas.openxmlformats.org/drawingml/2006/main" xmlns:r="http://schemas.openxmlformats.org/officeDocument/2006/relationships" xmlns:p="http://schemas.openxmlformats.org/presentationml/2006/main">
   <p:cSld>
     <p:spTree>
@@ -6317,7 +6418,7 @@
       </p:grpSpPr>
       <p:pic>
         <p:nvPicPr>
-          <p:cNvPr id="22" name="Picture 21"/>
+          <p:cNvPr id="10" name="Picture 9"/>
           <p:cNvPicPr>
             <a:picLocks noChangeAspect="1"/>
           </p:cNvPicPr>
@@ -6331,8 +6432,8 @@
         </p:blipFill>
         <p:spPr>
           <a:xfrm>
-            <a:off x="5953250" y="3660419"/>
-            <a:ext cx="6064447" cy="1581556"/>
+            <a:off x="685801" y="1919464"/>
+            <a:ext cx="6572250" cy="2457450"/>
           </a:xfrm>
           <a:prstGeom prst="rect">
             <a:avLst/>
@@ -6341,973 +6442,36 @@
       </p:pic>
       <p:sp>
         <p:nvSpPr>
-          <p:cNvPr id="27" name="Curved Right Arrow 26"/>
-          <p:cNvSpPr/>
-          <p:nvPr/>
-        </p:nvSpPr>
-        <p:spPr>
-          <a:xfrm>
-            <a:off x="5676476" y="3010124"/>
-            <a:ext cx="577838" cy="999168"/>
-          </a:xfrm>
-          <a:prstGeom prst="curvedRightArrow">
-            <a:avLst/>
-          </a:prstGeom>
-          <a:ln>
-            <a:solidFill>
-              <a:schemeClr val="bg2">
-                <a:lumMod val="50000"/>
-              </a:schemeClr>
-            </a:solidFill>
-          </a:ln>
-        </p:spPr>
-        <p:style>
-          <a:lnRef idx="3">
-            <a:schemeClr val="lt1"/>
-          </a:lnRef>
-          <a:fillRef idx="1">
-            <a:schemeClr val="accent3"/>
-          </a:fillRef>
-          <a:effectRef idx="1">
-            <a:schemeClr val="accent3"/>
-          </a:effectRef>
-          <a:fontRef idx="minor">
-            <a:schemeClr val="lt1"/>
-          </a:fontRef>
-        </p:style>
-        <p:txBody>
-          <a:bodyPr rtlCol="0" anchor="ctr"/>
-          <a:lstStyle/>
-          <a:p>
-            <a:pPr algn="ctr"/>
-            <a:endParaRPr lang="en-US">
-              <a:solidFill>
-                <a:schemeClr val="tx1"/>
-              </a:solidFill>
-            </a:endParaRPr>
-          </a:p>
-        </p:txBody>
-      </p:sp>
-      <p:grpSp>
-        <p:nvGrpSpPr>
-          <p:cNvPr id="14" name="Group 13"/>
-          <p:cNvGrpSpPr/>
-          <p:nvPr/>
-        </p:nvGrpSpPr>
-        <p:grpSpPr>
-          <a:xfrm>
-            <a:off x="895056" y="2552114"/>
-            <a:ext cx="1230591" cy="546686"/>
-            <a:chOff x="2099603" y="2552114"/>
-            <a:chExt cx="1230591" cy="546686"/>
-          </a:xfrm>
-        </p:grpSpPr>
-        <p:pic>
-          <p:nvPicPr>
-            <p:cNvPr id="4" name="Picture 3" descr="excelfile png definición de excel celda rango etiquetas de hoja"/>
-            <p:cNvPicPr>
-              <a:picLocks noChangeAspect="1"/>
-            </p:cNvPicPr>
-            <p:nvPr/>
-          </p:nvPicPr>
-          <p:blipFill>
-            <a:blip r:embed="rId3"/>
-            <a:stretch>
-              <a:fillRect/>
-            </a:stretch>
-          </p:blipFill>
-          <p:spPr>
-            <a:xfrm>
-              <a:off x="2099603" y="2552114"/>
-              <a:ext cx="546686" cy="546686"/>
-            </a:xfrm>
-            <a:prstGeom prst="rect">
-              <a:avLst/>
-            </a:prstGeom>
-          </p:spPr>
-        </p:pic>
-        <p:sp>
-          <p:nvSpPr>
-            <p:cNvPr id="5" name="TextBox 4"/>
-            <p:cNvSpPr txBox="1"/>
-            <p:nvPr/>
-          </p:nvSpPr>
-          <p:spPr>
-            <a:xfrm>
-              <a:off x="2646289" y="2640791"/>
-              <a:ext cx="683905" cy="369332"/>
-            </a:xfrm>
-            <a:prstGeom prst="rect">
-              <a:avLst/>
-            </a:prstGeom>
-            <a:noFill/>
-          </p:spPr>
-          <p:txBody>
-            <a:bodyPr wrap="none" rtlCol="0">
-              <a:spAutoFit/>
-            </a:bodyPr>
-            <a:lstStyle/>
-            <a:p>
-              <a:r>
-                <a:rPr lang="en-US" dirty="0"/>
-                <a:t>Texas</a:t>
-              </a:r>
-            </a:p>
-          </p:txBody>
-        </p:sp>
-      </p:grpSp>
-      <p:grpSp>
-        <p:nvGrpSpPr>
-          <p:cNvPr id="15" name="Group 14"/>
-          <p:cNvGrpSpPr/>
-          <p:nvPr/>
-        </p:nvGrpSpPr>
-        <p:grpSpPr>
-          <a:xfrm>
-            <a:off x="895056" y="3202410"/>
-            <a:ext cx="1613838" cy="546686"/>
-            <a:chOff x="2099603" y="3187477"/>
-            <a:chExt cx="1613838" cy="546686"/>
-          </a:xfrm>
-        </p:grpSpPr>
-        <p:pic>
-          <p:nvPicPr>
-            <p:cNvPr id="6" name="Picture 5" descr="excelfile png definición de excel celda rango etiquetas de hoja"/>
-            <p:cNvPicPr>
-              <a:picLocks noChangeAspect="1"/>
-            </p:cNvPicPr>
-            <p:nvPr/>
-          </p:nvPicPr>
-          <p:blipFill>
-            <a:blip r:embed="rId3"/>
-            <a:stretch>
-              <a:fillRect/>
-            </a:stretch>
-          </p:blipFill>
-          <p:spPr>
-            <a:xfrm>
-              <a:off x="2099603" y="3187477"/>
-              <a:ext cx="546686" cy="546686"/>
-            </a:xfrm>
-            <a:prstGeom prst="rect">
-              <a:avLst/>
-            </a:prstGeom>
-          </p:spPr>
-        </p:pic>
-        <p:sp>
-          <p:nvSpPr>
-            <p:cNvPr id="7" name="TextBox 6"/>
-            <p:cNvSpPr txBox="1"/>
-            <p:nvPr/>
-          </p:nvSpPr>
-          <p:spPr>
-            <a:xfrm>
-              <a:off x="2646289" y="3276154"/>
-              <a:ext cx="1067152" cy="369332"/>
-            </a:xfrm>
-            <a:prstGeom prst="rect">
-              <a:avLst/>
-            </a:prstGeom>
-            <a:noFill/>
-          </p:spPr>
-          <p:txBody>
-            <a:bodyPr wrap="none" rtlCol="0">
-              <a:spAutoFit/>
-            </a:bodyPr>
-            <a:lstStyle/>
-            <a:p>
-              <a:r>
-                <a:rPr lang="en-US" dirty="0"/>
-                <a:t>New York</a:t>
-              </a:r>
-            </a:p>
-          </p:txBody>
-        </p:sp>
-      </p:grpSp>
-      <p:grpSp>
-        <p:nvGrpSpPr>
-          <p:cNvPr id="16" name="Group 15"/>
-          <p:cNvGrpSpPr/>
-          <p:nvPr/>
-        </p:nvGrpSpPr>
-        <p:grpSpPr>
-          <a:xfrm>
-            <a:off x="895056" y="3852706"/>
-            <a:ext cx="1624160" cy="546686"/>
-            <a:chOff x="2099603" y="3882572"/>
-            <a:chExt cx="1624160" cy="546686"/>
-          </a:xfrm>
-        </p:grpSpPr>
-        <p:pic>
-          <p:nvPicPr>
-            <p:cNvPr id="8" name="Picture 7" descr="excelfile png definición de excel celda rango etiquetas de hoja"/>
-            <p:cNvPicPr>
-              <a:picLocks noChangeAspect="1"/>
-            </p:cNvPicPr>
-            <p:nvPr/>
-          </p:nvPicPr>
-          <p:blipFill>
-            <a:blip r:embed="rId3"/>
-            <a:stretch>
-              <a:fillRect/>
-            </a:stretch>
-          </p:blipFill>
-          <p:spPr>
-            <a:xfrm>
-              <a:off x="2099603" y="3882572"/>
-              <a:ext cx="546686" cy="546686"/>
-            </a:xfrm>
-            <a:prstGeom prst="rect">
-              <a:avLst/>
-            </a:prstGeom>
-          </p:spPr>
-        </p:pic>
-        <p:sp>
-          <p:nvSpPr>
-            <p:cNvPr id="9" name="TextBox 8"/>
-            <p:cNvSpPr txBox="1"/>
-            <p:nvPr/>
-          </p:nvSpPr>
-          <p:spPr>
-            <a:xfrm>
-              <a:off x="2646289" y="3971249"/>
-              <a:ext cx="1077474" cy="369332"/>
-            </a:xfrm>
-            <a:prstGeom prst="rect">
-              <a:avLst/>
-            </a:prstGeom>
-            <a:noFill/>
-          </p:spPr>
-          <p:txBody>
-            <a:bodyPr wrap="none" rtlCol="0">
-              <a:spAutoFit/>
-            </a:bodyPr>
-            <a:lstStyle/>
-            <a:p>
-              <a:r>
-                <a:rPr lang="en-US" dirty="0"/>
-                <a:t>California</a:t>
-              </a:r>
-            </a:p>
-          </p:txBody>
-        </p:sp>
-      </p:grpSp>
-      <p:grpSp>
-        <p:nvGrpSpPr>
-          <p:cNvPr id="17" name="Group 16"/>
-          <p:cNvGrpSpPr/>
-          <p:nvPr/>
-        </p:nvGrpSpPr>
-        <p:grpSpPr>
-          <a:xfrm>
-            <a:off x="895056" y="4503002"/>
-            <a:ext cx="1581008" cy="546686"/>
-            <a:chOff x="2099603" y="4517935"/>
-            <a:chExt cx="1581008" cy="546686"/>
-          </a:xfrm>
-        </p:grpSpPr>
-        <p:pic>
-          <p:nvPicPr>
-            <p:cNvPr id="10" name="Picture 9" descr="excelfile png definición de excel celda rango etiquetas de hoja"/>
-            <p:cNvPicPr>
-              <a:picLocks noChangeAspect="1"/>
-            </p:cNvPicPr>
-            <p:nvPr/>
-          </p:nvPicPr>
-          <p:blipFill>
-            <a:blip r:embed="rId3"/>
-            <a:stretch>
-              <a:fillRect/>
-            </a:stretch>
-          </p:blipFill>
-          <p:spPr>
-            <a:xfrm>
-              <a:off x="2099603" y="4517935"/>
-              <a:ext cx="546686" cy="546686"/>
-            </a:xfrm>
-            <a:prstGeom prst="rect">
-              <a:avLst/>
-            </a:prstGeom>
-          </p:spPr>
-        </p:pic>
-        <p:sp>
-          <p:nvSpPr>
-            <p:cNvPr id="11" name="TextBox 10"/>
-            <p:cNvSpPr txBox="1"/>
-            <p:nvPr/>
-          </p:nvSpPr>
-          <p:spPr>
-            <a:xfrm>
-              <a:off x="2646289" y="4606612"/>
-              <a:ext cx="1034322" cy="369332"/>
-            </a:xfrm>
-            <a:prstGeom prst="rect">
-              <a:avLst/>
-            </a:prstGeom>
-            <a:noFill/>
-          </p:spPr>
-          <p:txBody>
-            <a:bodyPr wrap="none" rtlCol="0">
-              <a:spAutoFit/>
-            </a:bodyPr>
-            <a:lstStyle/>
-            <a:p>
-              <a:r>
-                <a:rPr lang="en-US" dirty="0"/>
-                <a:t>Colorado</a:t>
-              </a:r>
-            </a:p>
-          </p:txBody>
-        </p:sp>
-      </p:grpSp>
-      <p:grpSp>
-        <p:nvGrpSpPr>
-          <p:cNvPr id="18" name="Group 17"/>
-          <p:cNvGrpSpPr/>
-          <p:nvPr/>
-        </p:nvGrpSpPr>
-        <p:grpSpPr>
-          <a:xfrm>
-            <a:off x="1113089" y="5153298"/>
-            <a:ext cx="1350817" cy="546686"/>
-            <a:chOff x="2646289" y="5241975"/>
-            <a:chExt cx="1350817" cy="546686"/>
-          </a:xfrm>
-        </p:grpSpPr>
-        <p:pic>
-          <p:nvPicPr>
-            <p:cNvPr id="12" name="Picture 11" descr="excelfile png definición de excel celda rango etiquetas de hoja"/>
-            <p:cNvPicPr>
-              <a:picLocks noChangeAspect="1"/>
-            </p:cNvPicPr>
-            <p:nvPr/>
-          </p:nvPicPr>
-          <p:blipFill>
-            <a:blip r:embed="rId3"/>
-            <a:stretch>
-              <a:fillRect/>
-            </a:stretch>
-          </p:blipFill>
-          <p:spPr>
-            <a:xfrm>
-              <a:off x="3450420" y="5241975"/>
-              <a:ext cx="546686" cy="546686"/>
-            </a:xfrm>
-            <a:prstGeom prst="rect">
-              <a:avLst/>
-            </a:prstGeom>
-          </p:spPr>
-        </p:pic>
-        <p:sp>
-          <p:nvSpPr>
-            <p:cNvPr id="13" name="TextBox 12"/>
-            <p:cNvSpPr txBox="1"/>
-            <p:nvPr/>
-          </p:nvSpPr>
-          <p:spPr>
-            <a:xfrm>
-              <a:off x="2646289" y="5330652"/>
-              <a:ext cx="798617" cy="369332"/>
-            </a:xfrm>
-            <a:prstGeom prst="rect">
-              <a:avLst/>
-            </a:prstGeom>
-            <a:noFill/>
-          </p:spPr>
-          <p:txBody>
-            <a:bodyPr wrap="none" rtlCol="0">
-              <a:spAutoFit/>
-            </a:bodyPr>
-            <a:lstStyle/>
-            <a:p>
-              <a:r>
-                <a:rPr lang="en-US" dirty="0"/>
-                <a:t>… + 46</a:t>
-              </a:r>
-            </a:p>
-          </p:txBody>
-        </p:sp>
-      </p:grpSp>
-      <p:sp>
-        <p:nvSpPr>
-          <p:cNvPr id="19" name="Right Brace 18"/>
-          <p:cNvSpPr/>
-          <p:nvPr/>
-        </p:nvSpPr>
-        <p:spPr>
-          <a:xfrm>
-            <a:off x="2508894" y="2350003"/>
-            <a:ext cx="756138" cy="3552092"/>
-          </a:xfrm>
-          <a:prstGeom prst="rightBrace">
-            <a:avLst/>
-          </a:prstGeom>
-          <a:ln>
-            <a:solidFill>
-              <a:schemeClr val="accent1">
-                <a:lumMod val="20000"/>
-                <a:lumOff val="80000"/>
-              </a:schemeClr>
-            </a:solidFill>
-          </a:ln>
-        </p:spPr>
-        <p:style>
-          <a:lnRef idx="3">
-            <a:schemeClr val="accent6"/>
-          </a:lnRef>
-          <a:fillRef idx="0">
-            <a:schemeClr val="accent6"/>
-          </a:fillRef>
-          <a:effectRef idx="2">
-            <a:schemeClr val="accent6"/>
-          </a:effectRef>
-          <a:fontRef idx="minor">
-            <a:schemeClr val="tx1"/>
-          </a:fontRef>
-        </p:style>
-        <p:txBody>
-          <a:bodyPr rtlCol="0" anchor="ctr"/>
-          <a:lstStyle/>
-          <a:p>
-            <a:pPr algn="ctr"/>
-            <a:endParaRPr lang="en-US"/>
-          </a:p>
-        </p:txBody>
-      </p:sp>
-      <p:sp>
-        <p:nvSpPr>
-          <p:cNvPr id="20" name="Oval 19"/>
-          <p:cNvSpPr/>
-          <p:nvPr/>
-        </p:nvSpPr>
-        <p:spPr>
-          <a:xfrm>
-            <a:off x="3431977" y="3357727"/>
-            <a:ext cx="1536644" cy="1536644"/>
-          </a:xfrm>
-          <a:prstGeom prst="ellipse">
-            <a:avLst/>
-          </a:prstGeom>
-        </p:spPr>
-        <p:style>
-          <a:lnRef idx="1">
-            <a:schemeClr val="dk1"/>
-          </a:lnRef>
-          <a:fillRef idx="3">
-            <a:schemeClr val="dk1"/>
-          </a:fillRef>
-          <a:effectRef idx="2">
-            <a:schemeClr val="dk1"/>
-          </a:effectRef>
-          <a:fontRef idx="minor">
-            <a:schemeClr val="lt1"/>
-          </a:fontRef>
-        </p:style>
-        <p:txBody>
-          <a:bodyPr rtlCol="0" anchor="ctr"/>
-          <a:lstStyle/>
-          <a:p>
-            <a:pPr algn="ctr"/>
+          <p:cNvPr id="2" name="Title 1"/>
+          <p:cNvSpPr>
+            <a:spLocks noGrp="1"/>
+          </p:cNvSpPr>
+          <p:nvPr>
+            <p:ph type="title"/>
+          </p:nvPr>
+        </p:nvSpPr>
+        <p:spPr/>
+        <p:txBody>
+          <a:bodyPr/>
+          <a:lstStyle/>
+          <a:p>
             <a:r>
               <a:rPr lang="en-US" dirty="0"/>
-              <a:t>Process</a:t>
-            </a:r>
-          </a:p>
-        </p:txBody>
-      </p:sp>
-      <p:sp>
-        <p:nvSpPr>
-          <p:cNvPr id="21" name="Left Brace 20"/>
-          <p:cNvSpPr/>
-          <p:nvPr/>
-        </p:nvSpPr>
-        <p:spPr>
-          <a:xfrm>
-            <a:off x="5135566" y="2328022"/>
-            <a:ext cx="817684" cy="3596053"/>
-          </a:xfrm>
-          <a:prstGeom prst="leftBrace">
-            <a:avLst/>
-          </a:prstGeom>
-          <a:ln>
-            <a:solidFill>
-              <a:schemeClr val="accent1">
-                <a:lumMod val="20000"/>
-                <a:lumOff val="80000"/>
-              </a:schemeClr>
-            </a:solidFill>
-          </a:ln>
-        </p:spPr>
-        <p:style>
-          <a:lnRef idx="3">
-            <a:schemeClr val="accent6"/>
-          </a:lnRef>
-          <a:fillRef idx="0">
-            <a:schemeClr val="accent6"/>
-          </a:fillRef>
-          <a:effectRef idx="2">
-            <a:schemeClr val="accent6"/>
-          </a:effectRef>
-          <a:fontRef idx="minor">
-            <a:schemeClr val="tx1"/>
-          </a:fontRef>
-        </p:style>
-        <p:txBody>
-          <a:bodyPr rtlCol="0" anchor="ctr"/>
-          <a:lstStyle/>
-          <a:p>
-            <a:pPr algn="ctr"/>
-            <a:endParaRPr lang="en-US"/>
-          </a:p>
-        </p:txBody>
-      </p:sp>
-      <p:grpSp>
-        <p:nvGrpSpPr>
-          <p:cNvPr id="23" name="Group 22"/>
-          <p:cNvGrpSpPr/>
-          <p:nvPr/>
-        </p:nvGrpSpPr>
-        <p:grpSpPr>
-          <a:xfrm>
-            <a:off x="5953250" y="2652515"/>
-            <a:ext cx="3159132" cy="546686"/>
-            <a:chOff x="2099603" y="2552114"/>
-            <a:chExt cx="3159132" cy="546686"/>
-          </a:xfrm>
-        </p:grpSpPr>
-        <p:pic>
-          <p:nvPicPr>
-            <p:cNvPr id="24" name="Picture 23" descr="excelfile png definición de excel celda rango etiquetas de hoja"/>
-            <p:cNvPicPr>
-              <a:picLocks noChangeAspect="1"/>
-            </p:cNvPicPr>
-            <p:nvPr/>
-          </p:nvPicPr>
-          <p:blipFill>
-            <a:blip r:embed="rId3"/>
-            <a:stretch>
-              <a:fillRect/>
-            </a:stretch>
-          </p:blipFill>
-          <p:spPr>
-            <a:xfrm>
-              <a:off x="2099603" y="2552114"/>
-              <a:ext cx="546686" cy="546686"/>
-            </a:xfrm>
-            <a:prstGeom prst="rect">
-              <a:avLst/>
-            </a:prstGeom>
-          </p:spPr>
-        </p:pic>
-        <p:sp>
-          <p:nvSpPr>
-            <p:cNvPr id="25" name="TextBox 24"/>
-            <p:cNvSpPr txBox="1"/>
-            <p:nvPr/>
-          </p:nvSpPr>
-          <p:spPr>
-            <a:xfrm>
-              <a:off x="2646289" y="2640791"/>
-              <a:ext cx="2612446" cy="369332"/>
-            </a:xfrm>
-            <a:prstGeom prst="rect">
-              <a:avLst/>
-            </a:prstGeom>
-            <a:noFill/>
-          </p:spPr>
-          <p:txBody>
-            <a:bodyPr wrap="none" rtlCol="0">
-              <a:spAutoFit/>
-            </a:bodyPr>
-            <a:lstStyle/>
-            <a:p>
-              <a:r>
-                <a:rPr lang="en-US" dirty="0"/>
-                <a:t>Consolidated List of Leads</a:t>
-              </a:r>
-            </a:p>
-          </p:txBody>
-        </p:sp>
-      </p:grpSp>
-      <p:sp>
-        <p:nvSpPr>
-          <p:cNvPr id="28" name="TextBox 27"/>
+              <a:t>Section 4 | Listing</a:t>
+            </a:r>
+          </a:p>
+        </p:txBody>
+      </p:sp>
+      <p:sp>
+        <p:nvSpPr>
+          <p:cNvPr id="4" name="TextBox 3"/>
           <p:cNvSpPr txBox="1"/>
           <p:nvPr/>
         </p:nvSpPr>
         <p:spPr>
           <a:xfrm>
-            <a:off x="1216847" y="1619907"/>
-            <a:ext cx="992579" cy="461665"/>
-          </a:xfrm>
-          <a:prstGeom prst="rect">
-            <a:avLst/>
-          </a:prstGeom>
-          <a:noFill/>
-        </p:spPr>
-        <p:txBody>
-          <a:bodyPr wrap="none" rtlCol="0">
-            <a:spAutoFit/>
-          </a:bodyPr>
-          <a:lstStyle/>
-          <a:p>
-            <a:r>
-              <a:rPr lang="en-US" sz="2400" b="1" dirty="0"/>
-              <a:t>Inputs</a:t>
-            </a:r>
-          </a:p>
-        </p:txBody>
-      </p:sp>
-      <p:sp>
-        <p:nvSpPr>
-          <p:cNvPr id="29" name="TextBox 28"/>
-          <p:cNvSpPr txBox="1"/>
-          <p:nvPr/>
-        </p:nvSpPr>
-        <p:spPr>
-          <a:xfrm>
-            <a:off x="6054596" y="1618967"/>
-            <a:ext cx="1226618" cy="461665"/>
-          </a:xfrm>
-          <a:prstGeom prst="rect">
-            <a:avLst/>
-          </a:prstGeom>
-          <a:noFill/>
-        </p:spPr>
-        <p:txBody>
-          <a:bodyPr wrap="none" rtlCol="0">
-            <a:spAutoFit/>
-          </a:bodyPr>
-          <a:lstStyle/>
-          <a:p>
-            <a:r>
-              <a:rPr lang="en-US" sz="2400" b="1" dirty="0"/>
-              <a:t>Outputs</a:t>
-            </a:r>
-          </a:p>
-        </p:txBody>
-      </p:sp>
-    </p:spTree>
-    <p:extLst>
-      <p:ext uri="{BB962C8B-B14F-4D97-AF65-F5344CB8AC3E}">
-        <p14:creationId xmlns:p14="http://schemas.microsoft.com/office/powerpoint/2010/main" val="2521872920"/>
-      </p:ext>
-    </p:extLst>
-  </p:cSld>
-  <p:clrMapOvr>
-    <a:masterClrMapping/>
-  </p:clrMapOvr>
-</p:sld>
-</file>
-
-<file path=ppt/slides/slide3.xml><?xml version="1.0" encoding="utf-8"?>
-<p:sld xmlns:a="http://schemas.openxmlformats.org/drawingml/2006/main" xmlns:r="http://schemas.openxmlformats.org/officeDocument/2006/relationships" xmlns:p="http://schemas.openxmlformats.org/presentationml/2006/main">
-  <p:cSld>
-    <p:spTree>
-      <p:nvGrpSpPr>
-        <p:cNvPr id="1" name=""/>
-        <p:cNvGrpSpPr/>
-        <p:nvPr/>
-      </p:nvGrpSpPr>
-      <p:grpSpPr>
-        <a:xfrm>
-          <a:off x="0" y="0"/>
-          <a:ext cx="0" cy="0"/>
-          <a:chOff x="0" y="0"/>
-          <a:chExt cx="0" cy="0"/>
-        </a:xfrm>
-      </p:grpSpPr>
-      <p:sp>
-        <p:nvSpPr>
-          <p:cNvPr id="2" name="Title 1"/>
-          <p:cNvSpPr>
-            <a:spLocks noGrp="1"/>
-          </p:cNvSpPr>
-          <p:nvPr>
-            <p:ph type="title"/>
-          </p:nvPr>
-        </p:nvSpPr>
-        <p:spPr/>
-        <p:txBody>
-          <a:bodyPr/>
-          <a:lstStyle/>
-          <a:p>
-            <a:r>
-              <a:rPr lang="en-US" dirty="0"/>
-              <a:t>Process Flow</a:t>
-            </a:r>
-          </a:p>
-        </p:txBody>
-      </p:sp>
-      <p:sp>
-        <p:nvSpPr>
-          <p:cNvPr id="3" name="Content Placeholder 2"/>
-          <p:cNvSpPr>
-            <a:spLocks noGrp="1"/>
-          </p:cNvSpPr>
-          <p:nvPr>
-            <p:ph idx="1"/>
-          </p:nvPr>
-        </p:nvSpPr>
-        <p:spPr/>
-        <p:txBody>
-          <a:bodyPr/>
-          <a:lstStyle/>
-          <a:p>
-            <a:endParaRPr lang="en-US" dirty="0"/>
-          </a:p>
-        </p:txBody>
-      </p:sp>
-    </p:spTree>
-    <p:extLst>
-      <p:ext uri="{BB962C8B-B14F-4D97-AF65-F5344CB8AC3E}">
-        <p14:creationId xmlns:p14="http://schemas.microsoft.com/office/powerpoint/2010/main" val="3815960845"/>
-      </p:ext>
-    </p:extLst>
-  </p:cSld>
-  <p:clrMapOvr>
-    <a:masterClrMapping/>
-  </p:clrMapOvr>
-</p:sld>
-</file>
-
-<file path=ppt/slides/slide4.xml><?xml version="1.0" encoding="utf-8"?>
-<p:sld xmlns:a="http://schemas.openxmlformats.org/drawingml/2006/main" xmlns:r="http://schemas.openxmlformats.org/officeDocument/2006/relationships" xmlns:p="http://schemas.openxmlformats.org/presentationml/2006/main">
-  <p:cSld>
-    <p:spTree>
-      <p:nvGrpSpPr>
-        <p:cNvPr id="1" name=""/>
-        <p:cNvGrpSpPr/>
-        <p:nvPr/>
-      </p:nvGrpSpPr>
-      <p:grpSpPr>
-        <a:xfrm>
-          <a:off x="0" y="0"/>
-          <a:ext cx="0" cy="0"/>
-          <a:chOff x="0" y="0"/>
-          <a:chExt cx="0" cy="0"/>
-        </a:xfrm>
-      </p:grpSpPr>
-      <p:sp>
-        <p:nvSpPr>
-          <p:cNvPr id="2" name="Title 1"/>
-          <p:cNvSpPr>
-            <a:spLocks noGrp="1"/>
-          </p:cNvSpPr>
-          <p:nvPr>
-            <p:ph type="title"/>
-          </p:nvPr>
-        </p:nvSpPr>
-        <p:spPr/>
-        <p:txBody>
-          <a:bodyPr/>
-          <a:lstStyle/>
-          <a:p>
-            <a:r>
-              <a:rPr lang="es-ES" dirty="0"/>
-              <a:t>L1 – Case 1</a:t>
-            </a:r>
-            <a:endParaRPr lang="en-US" dirty="0"/>
-          </a:p>
-        </p:txBody>
-      </p:sp>
-      <p:pic>
-        <p:nvPicPr>
-          <p:cNvPr id="4" name="Picture 3"/>
-          <p:cNvPicPr>
-            <a:picLocks noChangeAspect="1"/>
-          </p:cNvPicPr>
-          <p:nvPr/>
-        </p:nvPicPr>
-        <p:blipFill>
-          <a:blip r:embed="rId2"/>
-          <a:stretch>
-            <a:fillRect/>
-          </a:stretch>
-        </p:blipFill>
-        <p:spPr>
-          <a:xfrm>
-            <a:off x="4304474" y="544530"/>
-            <a:ext cx="7185140" cy="2389014"/>
-          </a:xfrm>
-          <a:prstGeom prst="rect">
-            <a:avLst/>
-          </a:prstGeom>
-        </p:spPr>
-      </p:pic>
-      <p:sp>
-        <p:nvSpPr>
-          <p:cNvPr id="5" name="TextBox 4"/>
-          <p:cNvSpPr txBox="1"/>
-          <p:nvPr/>
-        </p:nvSpPr>
-        <p:spPr>
-          <a:xfrm>
-            <a:off x="591451" y="3052455"/>
-            <a:ext cx="10898163" cy="2862322"/>
-          </a:xfrm>
-          <a:prstGeom prst="rect">
-            <a:avLst/>
-          </a:prstGeom>
-          <a:noFill/>
-        </p:spPr>
-        <p:txBody>
-          <a:bodyPr wrap="square" rtlCol="0">
-            <a:spAutoFit/>
-          </a:bodyPr>
-          <a:lstStyle/>
-          <a:p>
-            <a:r>
-              <a:rPr lang="en-US" dirty="0"/>
-              <a:t>We’ll start by taking files that are already formatted the way we want and consolidating them into one file. There’s a couple of things we’ll need to know about to do this:</a:t>
-            </a:r>
-          </a:p>
-          <a:p>
-            <a:pPr marL="285750" indent="-285750">
-              <a:buFont typeface="Arial" panose="020B0604020202020204" pitchFamily="34" charset="0"/>
-              <a:buChar char="•"/>
-            </a:pPr>
-            <a:r>
-              <a:rPr lang="en-US" dirty="0"/>
-              <a:t>Reading a directory with </a:t>
-            </a:r>
-            <a:r>
-              <a:rPr lang="en-US" dirty="0" err="1"/>
-              <a:t>fs.readdir</a:t>
-            </a:r>
-            <a:endParaRPr lang="en-US" dirty="0"/>
-          </a:p>
-          <a:p>
-            <a:pPr marL="285750" indent="-285750">
-              <a:buFont typeface="Arial" panose="020B0604020202020204" pitchFamily="34" charset="0"/>
-              <a:buChar char="•"/>
-            </a:pPr>
-            <a:r>
-              <a:rPr lang="en-US" dirty="0"/>
-              <a:t>Reading a file with </a:t>
-            </a:r>
-            <a:r>
-              <a:rPr lang="en-US" dirty="0" err="1"/>
-              <a:t>fs.readFile</a:t>
-            </a:r>
-            <a:endParaRPr lang="en-US" dirty="0"/>
-          </a:p>
-          <a:p>
-            <a:pPr marL="285750" indent="-285750">
-              <a:buFont typeface="Arial" panose="020B0604020202020204" pitchFamily="34" charset="0"/>
-              <a:buChar char="•"/>
-            </a:pPr>
-            <a:r>
-              <a:rPr lang="en-US" dirty="0"/>
-              <a:t>Writing a file with </a:t>
-            </a:r>
-            <a:r>
-              <a:rPr lang="en-US" dirty="0" err="1" smtClean="0"/>
-              <a:t>fs.writeFile</a:t>
-            </a:r>
-            <a:endParaRPr lang="en-US" dirty="0" smtClean="0"/>
-          </a:p>
-          <a:p>
-            <a:pPr marL="285750" indent="-285750">
-              <a:buFont typeface="Arial" panose="020B0604020202020204" pitchFamily="34" charset="0"/>
-              <a:buChar char="•"/>
-            </a:pPr>
-            <a:endParaRPr lang="en-US" dirty="0"/>
-          </a:p>
-          <a:p>
-            <a:r>
-              <a:rPr lang="en-US" dirty="0" smtClean="0"/>
-              <a:t>When we complete this case, we’ll have the bulk of automation handled provided all team members give us the information we want in exactly the format we want it in. The solution is scalable for any number of files. This can save you a lot of time or would be a necessity depending on the scale you are working with, especially if you wanted to consolidate say 1,000 files or 10,000 for that matter. </a:t>
-            </a:r>
-            <a:endParaRPr lang="en-US" dirty="0"/>
-          </a:p>
-        </p:txBody>
-      </p:sp>
-    </p:spTree>
-    <p:extLst>
-      <p:ext uri="{BB962C8B-B14F-4D97-AF65-F5344CB8AC3E}">
-        <p14:creationId xmlns:p14="http://schemas.microsoft.com/office/powerpoint/2010/main" val="2413513629"/>
-      </p:ext>
-    </p:extLst>
-  </p:cSld>
-  <p:clrMapOvr>
-    <a:masterClrMapping/>
-  </p:clrMapOvr>
-</p:sld>
-</file>
-
-<file path=ppt/slides/slide5.xml><?xml version="1.0" encoding="utf-8"?>
-<p:sld xmlns:a="http://schemas.openxmlformats.org/drawingml/2006/main" xmlns:r="http://schemas.openxmlformats.org/officeDocument/2006/relationships" xmlns:p="http://schemas.openxmlformats.org/presentationml/2006/main">
-  <p:cSld>
-    <p:spTree>
-      <p:nvGrpSpPr>
-        <p:cNvPr id="1" name=""/>
-        <p:cNvGrpSpPr/>
-        <p:nvPr/>
-      </p:nvGrpSpPr>
-      <p:grpSpPr>
-        <a:xfrm>
-          <a:off x="0" y="0"/>
-          <a:ext cx="0" cy="0"/>
-          <a:chOff x="0" y="0"/>
-          <a:chExt cx="0" cy="0"/>
-        </a:xfrm>
-      </p:grpSpPr>
-      <p:sp>
-        <p:nvSpPr>
-          <p:cNvPr id="2" name="Title 1"/>
-          <p:cNvSpPr>
-            <a:spLocks noGrp="1"/>
-          </p:cNvSpPr>
-          <p:nvPr>
-            <p:ph type="title"/>
-          </p:nvPr>
-        </p:nvSpPr>
-        <p:spPr/>
-        <p:txBody>
-          <a:bodyPr/>
-          <a:lstStyle/>
-          <a:p>
-            <a:r>
-              <a:rPr lang="en-US" dirty="0"/>
-              <a:t>Listing 3</a:t>
-            </a:r>
-          </a:p>
-        </p:txBody>
-      </p:sp>
-      <p:pic>
-        <p:nvPicPr>
-          <p:cNvPr id="4" name="Picture 3"/>
-          <p:cNvPicPr>
-            <a:picLocks noChangeAspect="1"/>
-          </p:cNvPicPr>
-          <p:nvPr/>
-        </p:nvPicPr>
-        <p:blipFill rotWithShape="1">
-          <a:blip r:embed="rId2"/>
-          <a:srcRect r="20984"/>
-          <a:stretch/>
-        </p:blipFill>
-        <p:spPr>
-          <a:xfrm>
-            <a:off x="588963" y="1810808"/>
-            <a:ext cx="5893118" cy="4895850"/>
-          </a:xfrm>
-          <a:prstGeom prst="rect">
-            <a:avLst/>
-          </a:prstGeom>
-        </p:spPr>
-      </p:pic>
-      <p:sp>
-        <p:nvSpPr>
-          <p:cNvPr id="5" name="TextBox 4"/>
-          <p:cNvSpPr txBox="1"/>
-          <p:nvPr/>
-        </p:nvSpPr>
-        <p:spPr>
-          <a:xfrm>
-            <a:off x="6675142" y="2209911"/>
-            <a:ext cx="5377962" cy="4524315"/>
+            <a:off x="6354726" y="3228678"/>
+            <a:ext cx="5172075" cy="1200329"/>
           </a:xfrm>
           <a:prstGeom prst="rect">
             <a:avLst/>
@@ -7334,524 +6498,20 @@
           <a:p>
             <a:r>
               <a:rPr lang="en-US" dirty="0"/>
-              <a:t>We’ve accomplished the task but this doesn’t really save us much in terms of effort. Importantly, we now know how to read and write individual files.</a:t>
-            </a:r>
-          </a:p>
-          <a:p>
-            <a:endParaRPr lang="en-US" dirty="0"/>
-          </a:p>
-          <a:p>
-            <a:r>
-              <a:rPr lang="en-US" dirty="0"/>
-              <a:t>Looking at our output, we see that we’ve concatenated the files. To make this output useable, we’d still have to remove the extra header rows tacked on when each file is joined.  </a:t>
-            </a:r>
-          </a:p>
-          <a:p>
-            <a:endParaRPr lang="en-US" dirty="0"/>
-          </a:p>
-          <a:p>
-            <a:r>
-              <a:rPr lang="en-US" dirty="0"/>
-              <a:t>Also, the code is hard to maintain. It’s in this structure because node executes asynchronously. It’s out of scope for this lesson to explain the asynchronous nature of node. To simplify our code, we will introduce you to synchronous read/write methods in the next listing. </a:t>
-            </a:r>
-          </a:p>
-        </p:txBody>
-      </p:sp>
-      <p:pic>
-        <p:nvPicPr>
-          <p:cNvPr id="6" name="Picture 5"/>
-          <p:cNvPicPr>
-            <a:picLocks noChangeAspect="1"/>
-          </p:cNvPicPr>
-          <p:nvPr/>
-        </p:nvPicPr>
-        <p:blipFill>
-          <a:blip r:embed="rId3"/>
-          <a:stretch>
-            <a:fillRect/>
-          </a:stretch>
-        </p:blipFill>
-        <p:spPr>
-          <a:xfrm>
-            <a:off x="4941401" y="106325"/>
-            <a:ext cx="6827266" cy="1999414"/>
-          </a:xfrm>
-          <a:prstGeom prst="rect">
-            <a:avLst/>
-          </a:prstGeom>
-        </p:spPr>
-      </p:pic>
-      <p:sp>
-        <p:nvSpPr>
-          <p:cNvPr id="7" name="TextBox 6"/>
-          <p:cNvSpPr txBox="1"/>
-          <p:nvPr/>
-        </p:nvSpPr>
-        <p:spPr>
-          <a:xfrm>
-            <a:off x="3009417" y="530395"/>
-            <a:ext cx="856325" cy="369332"/>
-          </a:xfrm>
-          <a:prstGeom prst="rect">
-            <a:avLst/>
-          </a:prstGeom>
-          <a:noFill/>
-        </p:spPr>
-        <p:txBody>
-          <a:bodyPr wrap="none" rtlCol="0">
-            <a:spAutoFit/>
-          </a:bodyPr>
-          <a:lstStyle/>
-          <a:p>
-            <a:r>
-              <a:rPr lang="en-US" dirty="0"/>
-              <a:t>Output</a:t>
-            </a:r>
-          </a:p>
-        </p:txBody>
-      </p:sp>
-      <p:sp>
-        <p:nvSpPr>
-          <p:cNvPr id="8" name="Right Arrow 7"/>
+              <a:t>I’ve added the synchronous read directory method. I commented out the rest of the code so that we can focus on looking at how this method works.</a:t>
+            </a:r>
+          </a:p>
+        </p:txBody>
+      </p:sp>
+      <p:sp>
+        <p:nvSpPr>
+          <p:cNvPr id="6" name="Rectangle 5"/>
           <p:cNvSpPr/>
           <p:nvPr/>
         </p:nvSpPr>
         <p:spPr>
           <a:xfrm>
-            <a:off x="4028946" y="609600"/>
-            <a:ext cx="625033" cy="290127"/>
-          </a:xfrm>
-          <a:prstGeom prst="rightArrow">
-            <a:avLst/>
-          </a:prstGeom>
-        </p:spPr>
-        <p:style>
-          <a:lnRef idx="2">
-            <a:schemeClr val="accent1">
-              <a:shade val="50000"/>
-            </a:schemeClr>
-          </a:lnRef>
-          <a:fillRef idx="1">
-            <a:schemeClr val="accent1"/>
-          </a:fillRef>
-          <a:effectRef idx="0">
-            <a:schemeClr val="accent1"/>
-          </a:effectRef>
-          <a:fontRef idx="minor">
-            <a:schemeClr val="lt1"/>
-          </a:fontRef>
-        </p:style>
-        <p:txBody>
-          <a:bodyPr rtlCol="0" anchor="ctr"/>
-          <a:lstStyle/>
-          <a:p>
-            <a:pPr algn="ctr"/>
-            <a:endParaRPr lang="en-US"/>
-          </a:p>
-        </p:txBody>
-      </p:sp>
-      <p:sp>
-        <p:nvSpPr>
-          <p:cNvPr id="3" name="Rectangle 2"/>
-          <p:cNvSpPr/>
-          <p:nvPr/>
-        </p:nvSpPr>
-        <p:spPr>
-          <a:xfrm>
-            <a:off x="4849792" y="899727"/>
-            <a:ext cx="7002684" cy="304040"/>
-          </a:xfrm>
-          <a:prstGeom prst="rect">
-            <a:avLst/>
-          </a:prstGeom>
-          <a:noFill/>
-          <a:ln>
-            <a:solidFill>
-              <a:srgbClr val="FF0000"/>
-            </a:solidFill>
-          </a:ln>
-        </p:spPr>
-        <p:style>
-          <a:lnRef idx="2">
-            <a:schemeClr val="accent1">
-              <a:shade val="50000"/>
-            </a:schemeClr>
-          </a:lnRef>
-          <a:fillRef idx="1">
-            <a:schemeClr val="accent1"/>
-          </a:fillRef>
-          <a:effectRef idx="0">
-            <a:schemeClr val="accent1"/>
-          </a:effectRef>
-          <a:fontRef idx="minor">
-            <a:schemeClr val="lt1"/>
-          </a:fontRef>
-        </p:style>
-        <p:txBody>
-          <a:bodyPr rtlCol="0" anchor="ctr"/>
-          <a:lstStyle/>
-          <a:p>
-            <a:pPr algn="ctr"/>
-            <a:endParaRPr lang="en-US"/>
-          </a:p>
-        </p:txBody>
-      </p:sp>
-    </p:spTree>
-    <p:extLst>
-      <p:ext uri="{BB962C8B-B14F-4D97-AF65-F5344CB8AC3E}">
-        <p14:creationId xmlns:p14="http://schemas.microsoft.com/office/powerpoint/2010/main" val="3006126857"/>
-      </p:ext>
-    </p:extLst>
-  </p:cSld>
-  <p:clrMapOvr>
-    <a:masterClrMapping/>
-  </p:clrMapOvr>
-</p:sld>
-</file>
-
-<file path=ppt/slides/slide6.xml><?xml version="1.0" encoding="utf-8"?>
-<p:sld xmlns:a="http://schemas.openxmlformats.org/drawingml/2006/main" xmlns:r="http://schemas.openxmlformats.org/officeDocument/2006/relationships" xmlns:p="http://schemas.openxmlformats.org/presentationml/2006/main">
-  <p:cSld>
-    <p:spTree>
-      <p:nvGrpSpPr>
-        <p:cNvPr id="1" name=""/>
-        <p:cNvGrpSpPr/>
-        <p:nvPr/>
-      </p:nvGrpSpPr>
-      <p:grpSpPr>
-        <a:xfrm>
-          <a:off x="0" y="0"/>
-          <a:ext cx="0" cy="0"/>
-          <a:chOff x="0" y="0"/>
-          <a:chExt cx="0" cy="0"/>
-        </a:xfrm>
-      </p:grpSpPr>
-      <p:sp>
-        <p:nvSpPr>
-          <p:cNvPr id="2" name="Title 1"/>
-          <p:cNvSpPr>
-            <a:spLocks noGrp="1"/>
-          </p:cNvSpPr>
-          <p:nvPr>
-            <p:ph type="title"/>
-          </p:nvPr>
-        </p:nvSpPr>
-        <p:spPr/>
-        <p:txBody>
-          <a:bodyPr/>
-          <a:lstStyle/>
-          <a:p>
-            <a:r>
-              <a:rPr lang="en-US" dirty="0"/>
-              <a:t>Listing 4</a:t>
-            </a:r>
-          </a:p>
-        </p:txBody>
-      </p:sp>
-      <p:sp>
-        <p:nvSpPr>
-          <p:cNvPr id="3" name="Content Placeholder 2"/>
-          <p:cNvSpPr>
-            <a:spLocks noGrp="1"/>
-          </p:cNvSpPr>
-          <p:nvPr>
-            <p:ph idx="1"/>
-          </p:nvPr>
-        </p:nvSpPr>
-        <p:spPr/>
-        <p:txBody>
-          <a:bodyPr/>
-          <a:lstStyle/>
-          <a:p>
-            <a:endParaRPr lang="en-US"/>
-          </a:p>
-        </p:txBody>
-      </p:sp>
-      <p:pic>
-        <p:nvPicPr>
-          <p:cNvPr id="4" name="Picture 3"/>
-          <p:cNvPicPr>
-            <a:picLocks noChangeAspect="1"/>
-          </p:cNvPicPr>
-          <p:nvPr/>
-        </p:nvPicPr>
-        <p:blipFill rotWithShape="1">
-          <a:blip r:embed="rId2"/>
-          <a:srcRect t="10593"/>
-          <a:stretch/>
-        </p:blipFill>
-        <p:spPr>
-          <a:xfrm>
-            <a:off x="685801" y="2065867"/>
-            <a:ext cx="8448675" cy="4155794"/>
-          </a:xfrm>
-          <a:prstGeom prst="rect">
-            <a:avLst/>
-          </a:prstGeom>
-        </p:spPr>
-      </p:pic>
-      <p:sp>
-        <p:nvSpPr>
-          <p:cNvPr id="6" name="TextBox 5"/>
-          <p:cNvSpPr txBox="1"/>
-          <p:nvPr/>
-        </p:nvSpPr>
-        <p:spPr>
-          <a:xfrm>
-            <a:off x="6559395" y="184341"/>
-            <a:ext cx="5377962" cy="923330"/>
-          </a:xfrm>
-          <a:prstGeom prst="rect">
-            <a:avLst/>
-          </a:prstGeom>
-          <a:solidFill>
-            <a:schemeClr val="bg2">
-              <a:lumMod val="50000"/>
-            </a:schemeClr>
-          </a:solidFill>
-          <a:ln>
-            <a:solidFill>
-              <a:schemeClr val="accent1">
-                <a:lumMod val="20000"/>
-                <a:lumOff val="80000"/>
-              </a:schemeClr>
-            </a:solidFill>
-          </a:ln>
-        </p:spPr>
-        <p:txBody>
-          <a:bodyPr wrap="square" lIns="182880" tIns="182880" rIns="182880" bIns="182880" rtlCol="0">
-            <a:spAutoFit/>
-          </a:bodyPr>
-          <a:lstStyle/>
-          <a:p>
-            <a:r>
-              <a:rPr lang="en-US" dirty="0" smtClean="0"/>
-              <a:t>Now the code is refactored to use synchronous fs methods. It’s much more concise and readable. </a:t>
-            </a:r>
-            <a:endParaRPr lang="en-US" dirty="0"/>
-          </a:p>
-        </p:txBody>
-      </p:sp>
-    </p:spTree>
-    <p:extLst>
-      <p:ext uri="{BB962C8B-B14F-4D97-AF65-F5344CB8AC3E}">
-        <p14:creationId xmlns:p14="http://schemas.microsoft.com/office/powerpoint/2010/main" val="761086988"/>
-      </p:ext>
-    </p:extLst>
-  </p:cSld>
-  <p:clrMapOvr>
-    <a:masterClrMapping/>
-  </p:clrMapOvr>
-</p:sld>
-</file>
-
-<file path=ppt/slides/slide7.xml><?xml version="1.0" encoding="utf-8"?>
-<p:sld xmlns:a="http://schemas.openxmlformats.org/drawingml/2006/main" xmlns:r="http://schemas.openxmlformats.org/officeDocument/2006/relationships" xmlns:p="http://schemas.openxmlformats.org/presentationml/2006/main">
-  <p:cSld>
-    <p:spTree>
-      <p:nvGrpSpPr>
-        <p:cNvPr id="1" name=""/>
-        <p:cNvGrpSpPr/>
-        <p:nvPr/>
-      </p:nvGrpSpPr>
-      <p:grpSpPr>
-        <a:xfrm>
-          <a:off x="0" y="0"/>
-          <a:ext cx="0" cy="0"/>
-          <a:chOff x="0" y="0"/>
-          <a:chExt cx="0" cy="0"/>
-        </a:xfrm>
-      </p:grpSpPr>
-      <p:sp>
-        <p:nvSpPr>
-          <p:cNvPr id="2" name="Title 1"/>
-          <p:cNvSpPr>
-            <a:spLocks noGrp="1"/>
-          </p:cNvSpPr>
-          <p:nvPr>
-            <p:ph type="title"/>
-          </p:nvPr>
-        </p:nvSpPr>
-        <p:spPr/>
-        <p:txBody>
-          <a:bodyPr/>
-          <a:lstStyle/>
-          <a:p>
-            <a:r>
-              <a:rPr lang="en-US" dirty="0"/>
-              <a:t>Listing 5 – </a:t>
-            </a:r>
-            <a:r>
-              <a:rPr lang="en-US" dirty="0" smtClean="0"/>
-              <a:t>Introducing </a:t>
-            </a:r>
-            <a:r>
-              <a:rPr lang="en-US" dirty="0" err="1"/>
-              <a:t>readdir</a:t>
-            </a:r>
-            <a:endParaRPr lang="en-US" dirty="0"/>
-          </a:p>
-        </p:txBody>
-      </p:sp>
-      <p:pic>
-        <p:nvPicPr>
-          <p:cNvPr id="1026" name="Picture 2"/>
-          <p:cNvPicPr>
-            <a:picLocks noChangeAspect="1" noChangeArrowheads="1"/>
-          </p:cNvPicPr>
-          <p:nvPr/>
-        </p:nvPicPr>
-        <p:blipFill>
-          <a:blip r:embed="rId2">
-            <a:extLst>
-              <a:ext uri="{28A0092B-C50C-407E-A947-70E740481C1C}">
-                <a14:useLocalDpi xmlns:a14="http://schemas.microsoft.com/office/drawing/2010/main" val="0"/>
-              </a:ext>
-            </a:extLst>
-          </a:blip>
-          <a:srcRect/>
-          <a:stretch>
-            <a:fillRect/>
-          </a:stretch>
-        </p:blipFill>
-        <p:spPr bwMode="auto">
-          <a:xfrm>
-            <a:off x="688694" y="2569861"/>
-            <a:ext cx="5791200" cy="2735263"/>
-          </a:xfrm>
-          <a:prstGeom prst="rect">
-            <a:avLst/>
-          </a:prstGeom>
-          <a:noFill/>
-          <a:ln>
-            <a:noFill/>
-          </a:ln>
-          <a:extLst>
-            <a:ext uri="{909E8E84-426E-40DD-AFC4-6F175D3DCCD1}">
-              <a14:hiddenFill xmlns:a14="http://schemas.microsoft.com/office/drawing/2010/main">
-                <a:solidFill>
-                  <a:schemeClr val="accent1"/>
-                </a:solidFill>
-              </a14:hiddenFill>
-            </a:ext>
-            <a:ext uri="{91240B29-F687-4F45-9708-019B960494DF}">
-              <a14:hiddenLine xmlns:a14="http://schemas.microsoft.com/office/drawing/2010/main" w="9525">
-                <a:solidFill>
-                  <a:schemeClr val="tx1"/>
-                </a:solidFill>
-                <a:miter lim="800000"/>
-                <a:headEnd/>
-                <a:tailEnd/>
-              </a14:hiddenLine>
-            </a:ext>
-          </a:extLst>
-        </p:spPr>
-      </p:pic>
-      <p:sp>
-        <p:nvSpPr>
-          <p:cNvPr id="5" name="TextBox 4"/>
-          <p:cNvSpPr txBox="1"/>
-          <p:nvPr/>
-        </p:nvSpPr>
-        <p:spPr>
-          <a:xfrm>
-            <a:off x="6629047" y="3014162"/>
-            <a:ext cx="5377962" cy="1200329"/>
-          </a:xfrm>
-          <a:prstGeom prst="rect">
-            <a:avLst/>
-          </a:prstGeom>
-          <a:solidFill>
-            <a:schemeClr val="bg2">
-              <a:lumMod val="50000"/>
-            </a:schemeClr>
-          </a:solidFill>
-          <a:ln>
-            <a:solidFill>
-              <a:schemeClr val="accent1">
-                <a:lumMod val="20000"/>
-                <a:lumOff val="80000"/>
-              </a:schemeClr>
-            </a:solidFill>
-          </a:ln>
-        </p:spPr>
-        <p:txBody>
-          <a:bodyPr wrap="square" lIns="182880" tIns="182880" rIns="182880" bIns="182880" rtlCol="0">
-            <a:spAutoFit/>
-          </a:bodyPr>
-          <a:lstStyle/>
-          <a:p>
-            <a:r>
-              <a:rPr lang="en-US" dirty="0" smtClean="0"/>
-              <a:t>I’ve added the synchronous read directory method. I commented out the rest of the code so that we can focus on looking at how this method works.</a:t>
-            </a:r>
-            <a:endParaRPr lang="en-US" dirty="0"/>
-          </a:p>
-        </p:txBody>
-      </p:sp>
-      <p:pic>
-        <p:nvPicPr>
-          <p:cNvPr id="1027" name="Picture 3"/>
-          <p:cNvPicPr>
-            <a:picLocks noChangeAspect="1" noChangeArrowheads="1"/>
-          </p:cNvPicPr>
-          <p:nvPr/>
-        </p:nvPicPr>
-        <p:blipFill>
-          <a:blip r:embed="rId3">
-            <a:extLst>
-              <a:ext uri="{28A0092B-C50C-407E-A947-70E740481C1C}">
-                <a14:useLocalDpi xmlns:a14="http://schemas.microsoft.com/office/drawing/2010/main" val="0"/>
-              </a:ext>
-            </a:extLst>
-          </a:blip>
-          <a:srcRect/>
-          <a:stretch>
-            <a:fillRect/>
-          </a:stretch>
-        </p:blipFill>
-        <p:spPr bwMode="auto">
-          <a:xfrm>
-            <a:off x="6723259" y="5505008"/>
-            <a:ext cx="5189537" cy="754063"/>
-          </a:xfrm>
-          <a:prstGeom prst="rect">
-            <a:avLst/>
-          </a:prstGeom>
-          <a:noFill/>
-          <a:ln>
-            <a:noFill/>
-          </a:ln>
-          <a:extLst>
-            <a:ext uri="{909E8E84-426E-40DD-AFC4-6F175D3DCCD1}">
-              <a14:hiddenFill xmlns:a14="http://schemas.microsoft.com/office/drawing/2010/main">
-                <a:solidFill>
-                  <a:schemeClr val="accent1"/>
-                </a:solidFill>
-              </a14:hiddenFill>
-            </a:ext>
-            <a:ext uri="{91240B29-F687-4F45-9708-019B960494DF}">
-              <a14:hiddenLine xmlns:a14="http://schemas.microsoft.com/office/drawing/2010/main" w="9525">
-                <a:solidFill>
-                  <a:schemeClr val="tx1"/>
-                </a:solidFill>
-                <a:miter lim="800000"/>
-                <a:headEnd/>
-                <a:tailEnd/>
-              </a14:hiddenLine>
-            </a:ext>
-          </a:extLst>
-        </p:spPr>
-      </p:pic>
-      <p:sp>
-        <p:nvSpPr>
-          <p:cNvPr id="4" name="Rectangle 3"/>
-          <p:cNvSpPr/>
-          <p:nvPr/>
-        </p:nvSpPr>
-        <p:spPr>
-          <a:xfrm>
-            <a:off x="4047281" y="5602147"/>
+            <a:off x="3772961" y="5484581"/>
             <a:ext cx="1886673" cy="656924"/>
           </a:xfrm>
           <a:prstGeom prst="rect">
@@ -7878,43 +6538,80 @@
           <a:p>
             <a:pPr algn="ctr"/>
             <a:r>
-              <a:rPr lang="en-US" dirty="0" smtClean="0"/>
+              <a:rPr lang="en-US" dirty="0"/>
               <a:t>Array of file names</a:t>
             </a:r>
-            <a:endParaRPr lang="en-US" dirty="0"/>
-          </a:p>
-        </p:txBody>
-      </p:sp>
-      <p:sp>
-        <p:nvSpPr>
-          <p:cNvPr id="6" name="TextBox 5"/>
-          <p:cNvSpPr txBox="1"/>
+          </a:p>
+        </p:txBody>
+      </p:sp>
+      <p:grpSp>
+        <p:nvGrpSpPr>
+          <p:cNvPr id="3" name="Group 2"/>
+          <p:cNvGrpSpPr/>
           <p:nvPr/>
-        </p:nvSpPr>
-        <p:spPr>
-          <a:xfrm>
-            <a:off x="6723259" y="5146468"/>
-            <a:ext cx="3633871" cy="369332"/>
-          </a:xfrm>
-          <a:prstGeom prst="rect">
-            <a:avLst/>
-          </a:prstGeom>
-          <a:noFill/>
-        </p:spPr>
-        <p:txBody>
-          <a:bodyPr wrap="square" rtlCol="0">
-            <a:spAutoFit/>
-          </a:bodyPr>
-          <a:lstStyle/>
-          <a:p>
-            <a:r>
-              <a:rPr lang="en-US" b="1" dirty="0" smtClean="0"/>
-              <a:t>Console output</a:t>
-            </a:r>
-            <a:endParaRPr lang="en-US" b="1" dirty="0"/>
-          </a:p>
-        </p:txBody>
-      </p:sp>
+        </p:nvGrpSpPr>
+        <p:grpSpPr>
+          <a:xfrm>
+            <a:off x="6279122" y="4980038"/>
+            <a:ext cx="5247680" cy="1294496"/>
+            <a:chOff x="6553442" y="5097604"/>
+            <a:chExt cx="5247680" cy="1294496"/>
+          </a:xfrm>
+        </p:grpSpPr>
+        <p:pic>
+          <p:nvPicPr>
+            <p:cNvPr id="9" name="Picture 8"/>
+            <p:cNvPicPr>
+              <a:picLocks noChangeAspect="1"/>
+            </p:cNvPicPr>
+            <p:nvPr/>
+          </p:nvPicPr>
+          <p:blipFill>
+            <a:blip r:embed="rId3"/>
+            <a:stretch>
+              <a:fillRect/>
+            </a:stretch>
+          </p:blipFill>
+          <p:spPr>
+            <a:xfrm>
+              <a:off x="6629047" y="5515800"/>
+              <a:ext cx="5172075" cy="876300"/>
+            </a:xfrm>
+            <a:prstGeom prst="rect">
+              <a:avLst/>
+            </a:prstGeom>
+          </p:spPr>
+        </p:pic>
+        <p:sp>
+          <p:nvSpPr>
+            <p:cNvPr id="7" name="TextBox 6"/>
+            <p:cNvSpPr txBox="1"/>
+            <p:nvPr/>
+          </p:nvSpPr>
+          <p:spPr>
+            <a:xfrm>
+              <a:off x="6553442" y="5097604"/>
+              <a:ext cx="3633871" cy="369332"/>
+            </a:xfrm>
+            <a:prstGeom prst="rect">
+              <a:avLst/>
+            </a:prstGeom>
+            <a:noFill/>
+          </p:spPr>
+          <p:txBody>
+            <a:bodyPr wrap="square" rtlCol="0">
+              <a:spAutoFit/>
+            </a:bodyPr>
+            <a:lstStyle/>
+            <a:p>
+              <a:r>
+                <a:rPr lang="en-US" b="1" dirty="0"/>
+                <a:t>Console output</a:t>
+              </a:r>
+            </a:p>
+          </p:txBody>
+        </p:sp>
+      </p:grpSp>
       <p:cxnSp>
         <p:nvCxnSpPr>
           <p:cNvPr id="8" name="Straight Arrow Connector 7"/>
@@ -7923,7 +6620,7 @@
         </p:nvCxnSpPr>
         <p:spPr>
           <a:xfrm>
-            <a:off x="5671594" y="5930609"/>
+            <a:off x="5397274" y="5813043"/>
             <a:ext cx="1180618" cy="0"/>
           </a:xfrm>
           <a:prstGeom prst="straightConnector1">
@@ -7951,7 +6648,7 @@
     </p:spTree>
     <p:extLst>
       <p:ext uri="{BB962C8B-B14F-4D97-AF65-F5344CB8AC3E}">
-        <p14:creationId xmlns:p14="http://schemas.microsoft.com/office/powerpoint/2010/main" val="3091865431"/>
+        <p14:creationId xmlns:p14="http://schemas.microsoft.com/office/powerpoint/2010/main" val="3006126857"/>
       </p:ext>
     </p:extLst>
   </p:cSld>
@@ -7961,7 +6658,7 @@
 </p:sld>
 </file>
 
-<file path=ppt/slides/slide8.xml><?xml version="1.0" encoding="utf-8"?>
+<file path=ppt/slides/slide11.xml><?xml version="1.0" encoding="utf-8"?>
 <p:sld xmlns:a="http://schemas.openxmlformats.org/drawingml/2006/main" xmlns:r="http://schemas.openxmlformats.org/officeDocument/2006/relationships" xmlns:p="http://schemas.openxmlformats.org/presentationml/2006/main">
   <p:cSld>
     <p:spTree>
@@ -7994,7 +6691,7 @@
           <a:lstStyle/>
           <a:p>
             <a:r>
-              <a:rPr lang="en-US" dirty="0" err="1" smtClean="0"/>
+              <a:rPr lang="en-US" dirty="0" err="1"/>
               <a:t>fs.readdirSync</a:t>
             </a:r>
             <a:endParaRPr lang="en-US" dirty="0"/>
@@ -8039,21 +6736,8 @@
                   <a:sysClr val="windowText" lastClr="000000"/>
                 </a:solidFill>
               </a:rPr>
-              <a:t>(path[, options</a:t>
-            </a:r>
-            <a:r>
-              <a:rPr lang="en-US" sz="1600" b="1" dirty="0" smtClean="0">
-                <a:solidFill>
-                  <a:sysClr val="windowText" lastClr="000000"/>
-                </a:solidFill>
-              </a:rPr>
-              <a:t>])</a:t>
-            </a:r>
-            <a:endParaRPr lang="en-US" sz="1600" b="1" dirty="0">
-              <a:solidFill>
-                <a:sysClr val="windowText" lastClr="000000"/>
-              </a:solidFill>
-            </a:endParaRPr>
+              <a:t>(path[, options])</a:t>
+            </a:r>
           </a:p>
           <a:p>
             <a:r>
@@ -8076,23 +6760,7 @@
                   <a:sysClr val="windowText" lastClr="000000"/>
                 </a:solidFill>
               </a:rPr>
-              <a:t>path </a:t>
-            </a:r>
-            <a:r>
-              <a:rPr lang="en-US" sz="1600" dirty="0" smtClean="0">
-                <a:solidFill>
-                  <a:sysClr val="windowText" lastClr="000000"/>
-                </a:solidFill>
-              </a:rPr>
-              <a:t> &lt;</a:t>
-            </a:r>
-            <a:r>
-              <a:rPr lang="en-US" sz="1600" dirty="0">
-                <a:solidFill>
-                  <a:sysClr val="windowText" lastClr="000000"/>
-                </a:solidFill>
-              </a:rPr>
-              <a:t>String&gt; | &lt;Buffer&gt;</a:t>
+              <a:t>path  &lt;String&gt; | &lt;Buffer&gt;</a:t>
             </a:r>
           </a:p>
           <a:p>
@@ -8106,23 +6774,7 @@
                   <a:sysClr val="windowText" lastClr="000000"/>
                 </a:solidFill>
               </a:rPr>
-              <a:t>options </a:t>
-            </a:r>
-            <a:r>
-              <a:rPr lang="en-US" sz="1600" dirty="0" smtClean="0">
-                <a:solidFill>
-                  <a:sysClr val="windowText" lastClr="000000"/>
-                </a:solidFill>
-              </a:rPr>
-              <a:t> &lt;</a:t>
-            </a:r>
-            <a:r>
-              <a:rPr lang="en-US" sz="1600" dirty="0">
-                <a:solidFill>
-                  <a:sysClr val="windowText" lastClr="000000"/>
-                </a:solidFill>
-              </a:rPr>
-              <a:t>String&gt; | &lt;Object&gt;</a:t>
+              <a:t>options  &lt;String&gt; | &lt;Object&gt;</a:t>
             </a:r>
           </a:p>
           <a:p>
@@ -8695,10 +7347,9 @@
           <a:lstStyle/>
           <a:p>
             <a:r>
-              <a:rPr lang="en-US" dirty="0" smtClean="0"/>
+              <a:rPr lang="en-US" dirty="0"/>
               <a:t>[   ‘file1.csv’,  ‘file2.csv’, ‘file3.csv’  ]</a:t>
             </a:r>
-            <a:endParaRPr lang="en-US" dirty="0"/>
           </a:p>
         </p:txBody>
       </p:sp>
@@ -8736,6 +7387,2673 @@
     <p:extLst>
       <p:ext uri="{BB962C8B-B14F-4D97-AF65-F5344CB8AC3E}">
         <p14:creationId xmlns:p14="http://schemas.microsoft.com/office/powerpoint/2010/main" val="1813583687"/>
+      </p:ext>
+    </p:extLst>
+  </p:cSld>
+  <p:clrMapOvr>
+    <a:masterClrMapping/>
+  </p:clrMapOvr>
+</p:sld>
+</file>
+
+<file path=ppt/slides/slide12.xml><?xml version="1.0" encoding="utf-8"?>
+<p:sld xmlns:a="http://schemas.openxmlformats.org/drawingml/2006/main" xmlns:r="http://schemas.openxmlformats.org/officeDocument/2006/relationships" xmlns:p="http://schemas.openxmlformats.org/presentationml/2006/main">
+  <p:cSld>
+    <p:spTree>
+      <p:nvGrpSpPr>
+        <p:cNvPr id="1" name=""/>
+        <p:cNvGrpSpPr/>
+        <p:nvPr/>
+      </p:nvGrpSpPr>
+      <p:grpSpPr>
+        <a:xfrm>
+          <a:off x="0" y="0"/>
+          <a:ext cx="0" cy="0"/>
+          <a:chOff x="0" y="0"/>
+          <a:chExt cx="0" cy="0"/>
+        </a:xfrm>
+      </p:grpSpPr>
+      <p:pic>
+        <p:nvPicPr>
+          <p:cNvPr id="5" name="Picture 4"/>
+          <p:cNvPicPr>
+            <a:picLocks noChangeAspect="1"/>
+          </p:cNvPicPr>
+          <p:nvPr/>
+        </p:nvPicPr>
+        <p:blipFill>
+          <a:blip r:embed="rId2"/>
+          <a:stretch>
+            <a:fillRect/>
+          </a:stretch>
+        </p:blipFill>
+        <p:spPr>
+          <a:xfrm>
+            <a:off x="5289752" y="1603021"/>
+            <a:ext cx="6095593" cy="3489726"/>
+          </a:xfrm>
+          <a:prstGeom prst="roundRect">
+            <a:avLst>
+              <a:gd name="adj" fmla="val 4380"/>
+            </a:avLst>
+          </a:prstGeom>
+          <a:ln w="50800" cap="sq" cmpd="dbl">
+            <a:gradFill flip="none" rotWithShape="1">
+              <a:gsLst>
+                <a:gs pos="0">
+                  <a:srgbClr val="FFFFFF"/>
+                </a:gs>
+                <a:gs pos="100000">
+                  <a:schemeClr val="tx1">
+                    <a:alpha val="0"/>
+                  </a:schemeClr>
+                </a:gs>
+              </a:gsLst>
+              <a:path path="circle">
+                <a:fillToRect l="50000" t="50000" r="50000" b="50000"/>
+              </a:path>
+              <a:tileRect/>
+            </a:gradFill>
+            <a:miter lim="800000"/>
+          </a:ln>
+          <a:effectLst>
+            <a:outerShdw blurRad="254000" algn="tl" rotWithShape="0">
+              <a:srgbClr val="000000">
+                <a:alpha val="43000"/>
+              </a:srgbClr>
+            </a:outerShdw>
+          </a:effectLst>
+        </p:spPr>
+      </p:pic>
+      <p:sp>
+        <p:nvSpPr>
+          <p:cNvPr id="2" name="Title 1"/>
+          <p:cNvSpPr>
+            <a:spLocks noGrp="1"/>
+          </p:cNvSpPr>
+          <p:nvPr>
+            <p:ph type="title"/>
+          </p:nvPr>
+        </p:nvSpPr>
+        <p:spPr>
+          <a:xfrm>
+            <a:off x="825909" y="808055"/>
+            <a:ext cx="3979205" cy="1453363"/>
+          </a:xfrm>
+        </p:spPr>
+        <p:txBody>
+          <a:bodyPr>
+            <a:normAutofit/>
+          </a:bodyPr>
+          <a:lstStyle/>
+          <a:p>
+            <a:r>
+              <a:rPr lang="en-US" dirty="0"/>
+              <a:t>Section 5 | Listing</a:t>
+            </a:r>
+          </a:p>
+        </p:txBody>
+      </p:sp>
+      <p:sp>
+        <p:nvSpPr>
+          <p:cNvPr id="3" name="Content Placeholder 2"/>
+          <p:cNvSpPr>
+            <a:spLocks noGrp="1"/>
+          </p:cNvSpPr>
+          <p:nvPr>
+            <p:ph idx="1"/>
+          </p:nvPr>
+        </p:nvSpPr>
+        <p:spPr>
+          <a:xfrm>
+            <a:off x="802178" y="2261420"/>
+            <a:ext cx="4002936" cy="3637935"/>
+          </a:xfrm>
+        </p:spPr>
+        <p:txBody>
+          <a:bodyPr>
+            <a:normAutofit/>
+          </a:bodyPr>
+          <a:lstStyle/>
+          <a:p>
+            <a:r>
+              <a:rPr lang="en-US" dirty="0"/>
+              <a:t>Here I explain how arrays work. The code is organized the way it is to illustrate the concept</a:t>
+            </a:r>
+          </a:p>
+          <a:p>
+            <a:endParaRPr lang="en-US" dirty="0"/>
+          </a:p>
+        </p:txBody>
+      </p:sp>
+    </p:spTree>
+    <p:extLst>
+      <p:ext uri="{BB962C8B-B14F-4D97-AF65-F5344CB8AC3E}">
+        <p14:creationId xmlns:p14="http://schemas.microsoft.com/office/powerpoint/2010/main" val="3442802156"/>
+      </p:ext>
+    </p:extLst>
+  </p:cSld>
+  <p:clrMapOvr>
+    <a:masterClrMapping/>
+  </p:clrMapOvr>
+</p:sld>
+</file>
+
+<file path=ppt/slides/slide13.xml><?xml version="1.0" encoding="utf-8"?>
+<p:sld xmlns:a="http://schemas.openxmlformats.org/drawingml/2006/main" xmlns:r="http://schemas.openxmlformats.org/officeDocument/2006/relationships" xmlns:p="http://schemas.openxmlformats.org/presentationml/2006/main">
+  <p:cSld>
+    <p:spTree>
+      <p:nvGrpSpPr>
+        <p:cNvPr id="1" name=""/>
+        <p:cNvGrpSpPr/>
+        <p:nvPr/>
+      </p:nvGrpSpPr>
+      <p:grpSpPr>
+        <a:xfrm>
+          <a:off x="0" y="0"/>
+          <a:ext cx="0" cy="0"/>
+          <a:chOff x="0" y="0"/>
+          <a:chExt cx="0" cy="0"/>
+        </a:xfrm>
+      </p:grpSpPr>
+      <p:sp>
+        <p:nvSpPr>
+          <p:cNvPr id="2" name="Title 1"/>
+          <p:cNvSpPr>
+            <a:spLocks noGrp="1"/>
+          </p:cNvSpPr>
+          <p:nvPr>
+            <p:ph type="title"/>
+          </p:nvPr>
+        </p:nvSpPr>
+        <p:spPr>
+          <a:xfrm>
+            <a:off x="825909" y="808055"/>
+            <a:ext cx="3979205" cy="1453363"/>
+          </a:xfrm>
+        </p:spPr>
+        <p:txBody>
+          <a:bodyPr>
+            <a:normAutofit/>
+          </a:bodyPr>
+          <a:lstStyle/>
+          <a:p>
+            <a:r>
+              <a:rPr lang="en-US" dirty="0"/>
+              <a:t>Section 6 | Listing</a:t>
+            </a:r>
+          </a:p>
+        </p:txBody>
+      </p:sp>
+      <p:sp>
+        <p:nvSpPr>
+          <p:cNvPr id="3" name="Content Placeholder 2"/>
+          <p:cNvSpPr>
+            <a:spLocks noGrp="1"/>
+          </p:cNvSpPr>
+          <p:nvPr>
+            <p:ph idx="1"/>
+          </p:nvPr>
+        </p:nvSpPr>
+        <p:spPr>
+          <a:xfrm>
+            <a:off x="802178" y="2261420"/>
+            <a:ext cx="4002936" cy="3637935"/>
+          </a:xfrm>
+        </p:spPr>
+        <p:txBody>
+          <a:bodyPr>
+            <a:normAutofit/>
+          </a:bodyPr>
+          <a:lstStyle/>
+          <a:p>
+            <a:r>
+              <a:rPr lang="en-US" dirty="0"/>
+              <a:t>Introduce the += operator</a:t>
+            </a:r>
+          </a:p>
+          <a:p>
+            <a:r>
+              <a:rPr lang="en-US" dirty="0"/>
+              <a:t>See how it simplifies the code</a:t>
+            </a:r>
+          </a:p>
+        </p:txBody>
+      </p:sp>
+      <p:pic>
+        <p:nvPicPr>
+          <p:cNvPr id="7" name="Picture 6"/>
+          <p:cNvPicPr>
+            <a:picLocks noChangeAspect="1"/>
+          </p:cNvPicPr>
+          <p:nvPr/>
+        </p:nvPicPr>
+        <p:blipFill>
+          <a:blip r:embed="rId2"/>
+          <a:stretch>
+            <a:fillRect/>
+          </a:stretch>
+        </p:blipFill>
+        <p:spPr>
+          <a:xfrm>
+            <a:off x="5321754" y="1708104"/>
+            <a:ext cx="6381750" cy="3781425"/>
+          </a:xfrm>
+          <a:prstGeom prst="rect">
+            <a:avLst/>
+          </a:prstGeom>
+        </p:spPr>
+      </p:pic>
+    </p:spTree>
+    <p:extLst>
+      <p:ext uri="{BB962C8B-B14F-4D97-AF65-F5344CB8AC3E}">
+        <p14:creationId xmlns:p14="http://schemas.microsoft.com/office/powerpoint/2010/main" val="2589246716"/>
+      </p:ext>
+    </p:extLst>
+  </p:cSld>
+  <p:clrMapOvr>
+    <a:masterClrMapping/>
+  </p:clrMapOvr>
+</p:sld>
+</file>
+
+<file path=ppt/slides/slide14.xml><?xml version="1.0" encoding="utf-8"?>
+<p:sld xmlns:a="http://schemas.openxmlformats.org/drawingml/2006/main" xmlns:r="http://schemas.openxmlformats.org/officeDocument/2006/relationships" xmlns:p="http://schemas.openxmlformats.org/presentationml/2006/main">
+  <p:cSld>
+    <p:spTree>
+      <p:nvGrpSpPr>
+        <p:cNvPr id="1" name=""/>
+        <p:cNvGrpSpPr/>
+        <p:nvPr/>
+      </p:nvGrpSpPr>
+      <p:grpSpPr>
+        <a:xfrm>
+          <a:off x="0" y="0"/>
+          <a:ext cx="0" cy="0"/>
+          <a:chOff x="0" y="0"/>
+          <a:chExt cx="0" cy="0"/>
+        </a:xfrm>
+      </p:grpSpPr>
+      <p:pic>
+        <p:nvPicPr>
+          <p:cNvPr id="4" name="Picture 3"/>
+          <p:cNvPicPr>
+            <a:picLocks noChangeAspect="1"/>
+          </p:cNvPicPr>
+          <p:nvPr/>
+        </p:nvPicPr>
+        <p:blipFill>
+          <a:blip r:embed="rId2"/>
+          <a:stretch>
+            <a:fillRect/>
+          </a:stretch>
+        </p:blipFill>
+        <p:spPr>
+          <a:xfrm>
+            <a:off x="5271464" y="2261418"/>
+            <a:ext cx="6095593" cy="3139230"/>
+          </a:xfrm>
+          <a:prstGeom prst="roundRect">
+            <a:avLst>
+              <a:gd name="adj" fmla="val 4380"/>
+            </a:avLst>
+          </a:prstGeom>
+          <a:ln w="50800" cap="sq" cmpd="dbl">
+            <a:gradFill flip="none" rotWithShape="1">
+              <a:gsLst>
+                <a:gs pos="0">
+                  <a:srgbClr val="FFFFFF"/>
+                </a:gs>
+                <a:gs pos="100000">
+                  <a:schemeClr val="tx1">
+                    <a:alpha val="0"/>
+                  </a:schemeClr>
+                </a:gs>
+              </a:gsLst>
+              <a:path path="circle">
+                <a:fillToRect l="50000" t="50000" r="50000" b="50000"/>
+              </a:path>
+              <a:tileRect/>
+            </a:gradFill>
+            <a:miter lim="800000"/>
+          </a:ln>
+          <a:effectLst>
+            <a:outerShdw blurRad="254000" algn="tl" rotWithShape="0">
+              <a:srgbClr val="000000">
+                <a:alpha val="43000"/>
+              </a:srgbClr>
+            </a:outerShdw>
+          </a:effectLst>
+        </p:spPr>
+      </p:pic>
+      <p:sp>
+        <p:nvSpPr>
+          <p:cNvPr id="2" name="Title 1"/>
+          <p:cNvSpPr>
+            <a:spLocks noGrp="1"/>
+          </p:cNvSpPr>
+          <p:nvPr>
+            <p:ph type="title"/>
+          </p:nvPr>
+        </p:nvSpPr>
+        <p:spPr>
+          <a:xfrm>
+            <a:off x="825909" y="808055"/>
+            <a:ext cx="3979205" cy="1453363"/>
+          </a:xfrm>
+        </p:spPr>
+        <p:txBody>
+          <a:bodyPr>
+            <a:normAutofit/>
+          </a:bodyPr>
+          <a:lstStyle/>
+          <a:p>
+            <a:r>
+              <a:rPr lang="en-US" dirty="0"/>
+              <a:t>Section 7 | Listing</a:t>
+            </a:r>
+          </a:p>
+        </p:txBody>
+      </p:sp>
+      <p:sp>
+        <p:nvSpPr>
+          <p:cNvPr id="3" name="Content Placeholder 2"/>
+          <p:cNvSpPr>
+            <a:spLocks noGrp="1"/>
+          </p:cNvSpPr>
+          <p:nvPr>
+            <p:ph idx="1"/>
+          </p:nvPr>
+        </p:nvSpPr>
+        <p:spPr>
+          <a:xfrm>
+            <a:off x="802178" y="2261420"/>
+            <a:ext cx="4002936" cy="3637935"/>
+          </a:xfrm>
+        </p:spPr>
+        <p:txBody>
+          <a:bodyPr>
+            <a:normAutofit/>
+          </a:bodyPr>
+          <a:lstStyle/>
+          <a:p>
+            <a:r>
+              <a:rPr lang="en-US" dirty="0"/>
+              <a:t>Introduce looping</a:t>
+            </a:r>
+          </a:p>
+          <a:p>
+            <a:r>
+              <a:rPr lang="en-US" dirty="0"/>
+              <a:t>Now we’re really getting the program to work for us. </a:t>
+            </a:r>
+          </a:p>
+        </p:txBody>
+      </p:sp>
+    </p:spTree>
+    <p:extLst>
+      <p:ext uri="{BB962C8B-B14F-4D97-AF65-F5344CB8AC3E}">
+        <p14:creationId xmlns:p14="http://schemas.microsoft.com/office/powerpoint/2010/main" val="2992974097"/>
+      </p:ext>
+    </p:extLst>
+  </p:cSld>
+  <p:clrMapOvr>
+    <a:masterClrMapping/>
+  </p:clrMapOvr>
+</p:sld>
+</file>
+
+<file path=ppt/slides/slide15.xml><?xml version="1.0" encoding="utf-8"?>
+<p:sld xmlns:a="http://schemas.openxmlformats.org/drawingml/2006/main" xmlns:r="http://schemas.openxmlformats.org/officeDocument/2006/relationships" xmlns:p="http://schemas.openxmlformats.org/presentationml/2006/main">
+  <p:cSld>
+    <p:spTree>
+      <p:nvGrpSpPr>
+        <p:cNvPr id="1" name=""/>
+        <p:cNvGrpSpPr/>
+        <p:nvPr/>
+      </p:nvGrpSpPr>
+      <p:grpSpPr>
+        <a:xfrm>
+          <a:off x="0" y="0"/>
+          <a:ext cx="0" cy="0"/>
+          <a:chOff x="0" y="0"/>
+          <a:chExt cx="0" cy="0"/>
+        </a:xfrm>
+      </p:grpSpPr>
+      <p:sp>
+        <p:nvSpPr>
+          <p:cNvPr id="2" name="Title 1"/>
+          <p:cNvSpPr>
+            <a:spLocks noGrp="1"/>
+          </p:cNvSpPr>
+          <p:nvPr>
+            <p:ph type="title"/>
+          </p:nvPr>
+        </p:nvSpPr>
+        <p:spPr>
+          <a:xfrm>
+            <a:off x="825909" y="808055"/>
+            <a:ext cx="3979205" cy="1453363"/>
+          </a:xfrm>
+        </p:spPr>
+        <p:txBody>
+          <a:bodyPr>
+            <a:normAutofit/>
+          </a:bodyPr>
+          <a:lstStyle/>
+          <a:p>
+            <a:r>
+              <a:rPr lang="en-US" dirty="0"/>
+              <a:t>Section 8 | Listing</a:t>
+            </a:r>
+          </a:p>
+        </p:txBody>
+      </p:sp>
+      <p:sp>
+        <p:nvSpPr>
+          <p:cNvPr id="3" name="Content Placeholder 2"/>
+          <p:cNvSpPr>
+            <a:spLocks noGrp="1"/>
+          </p:cNvSpPr>
+          <p:nvPr>
+            <p:ph idx="1"/>
+          </p:nvPr>
+        </p:nvSpPr>
+        <p:spPr>
+          <a:xfrm>
+            <a:off x="802178" y="2261420"/>
+            <a:ext cx="4002936" cy="3637935"/>
+          </a:xfrm>
+        </p:spPr>
+        <p:txBody>
+          <a:bodyPr>
+            <a:normAutofit/>
+          </a:bodyPr>
+          <a:lstStyle/>
+          <a:p>
+            <a:r>
+              <a:rPr lang="en-US" dirty="0"/>
+              <a:t>I like having the program tell us what it is doing while it’s doing it. Let’s add our logging back in.</a:t>
+            </a:r>
+          </a:p>
+        </p:txBody>
+      </p:sp>
+    </p:spTree>
+    <p:extLst>
+      <p:ext uri="{BB962C8B-B14F-4D97-AF65-F5344CB8AC3E}">
+        <p14:creationId xmlns:p14="http://schemas.microsoft.com/office/powerpoint/2010/main" val="3750904850"/>
+      </p:ext>
+    </p:extLst>
+  </p:cSld>
+  <p:clrMapOvr>
+    <a:masterClrMapping/>
+  </p:clrMapOvr>
+</p:sld>
+</file>
+
+<file path=ppt/slides/slide16.xml><?xml version="1.0" encoding="utf-8"?>
+<p:sld xmlns:a="http://schemas.openxmlformats.org/drawingml/2006/main" xmlns:r="http://schemas.openxmlformats.org/officeDocument/2006/relationships" xmlns:p="http://schemas.openxmlformats.org/presentationml/2006/main">
+  <p:cSld>
+    <p:spTree>
+      <p:nvGrpSpPr>
+        <p:cNvPr id="1" name=""/>
+        <p:cNvGrpSpPr/>
+        <p:nvPr/>
+      </p:nvGrpSpPr>
+      <p:grpSpPr>
+        <a:xfrm>
+          <a:off x="0" y="0"/>
+          <a:ext cx="0" cy="0"/>
+          <a:chOff x="0" y="0"/>
+          <a:chExt cx="0" cy="0"/>
+        </a:xfrm>
+      </p:grpSpPr>
+      <p:sp>
+        <p:nvSpPr>
+          <p:cNvPr id="2" name="Title 1"/>
+          <p:cNvSpPr>
+            <a:spLocks noGrp="1"/>
+          </p:cNvSpPr>
+          <p:nvPr>
+            <p:ph type="title"/>
+          </p:nvPr>
+        </p:nvSpPr>
+        <p:spPr/>
+        <p:txBody>
+          <a:bodyPr/>
+          <a:lstStyle/>
+          <a:p>
+            <a:r>
+              <a:rPr lang="en-US" dirty="0" smtClean="0"/>
+              <a:t>Section 9 | Listing</a:t>
+            </a:r>
+            <a:endParaRPr lang="en-US" dirty="0"/>
+          </a:p>
+        </p:txBody>
+      </p:sp>
+      <p:sp>
+        <p:nvSpPr>
+          <p:cNvPr id="3" name="Content Placeholder 2"/>
+          <p:cNvSpPr>
+            <a:spLocks noGrp="1"/>
+          </p:cNvSpPr>
+          <p:nvPr>
+            <p:ph idx="1"/>
+          </p:nvPr>
+        </p:nvSpPr>
+        <p:spPr/>
+        <p:txBody>
+          <a:bodyPr/>
+          <a:lstStyle/>
+          <a:p>
+            <a:r>
+              <a:rPr lang="en-US" dirty="0" smtClean="0"/>
+              <a:t>For an acceptable finished product, we still have to manually remove the extra headers from each file added to the consolidated report .</a:t>
+            </a:r>
+            <a:endParaRPr lang="en-US" dirty="0"/>
+          </a:p>
+        </p:txBody>
+      </p:sp>
+    </p:spTree>
+    <p:extLst>
+      <p:ext uri="{BB962C8B-B14F-4D97-AF65-F5344CB8AC3E}">
+        <p14:creationId xmlns:p14="http://schemas.microsoft.com/office/powerpoint/2010/main" val="1663894418"/>
+      </p:ext>
+    </p:extLst>
+  </p:cSld>
+  <p:clrMapOvr>
+    <a:masterClrMapping/>
+  </p:clrMapOvr>
+</p:sld>
+</file>
+
+<file path=ppt/slides/slide2.xml><?xml version="1.0" encoding="utf-8"?>
+<p:sld xmlns:a="http://schemas.openxmlformats.org/drawingml/2006/main" xmlns:r="http://schemas.openxmlformats.org/officeDocument/2006/relationships" xmlns:p="http://schemas.openxmlformats.org/presentationml/2006/main">
+  <p:cSld>
+    <p:spTree>
+      <p:nvGrpSpPr>
+        <p:cNvPr id="1" name=""/>
+        <p:cNvGrpSpPr/>
+        <p:nvPr/>
+      </p:nvGrpSpPr>
+      <p:grpSpPr>
+        <a:xfrm>
+          <a:off x="0" y="0"/>
+          <a:ext cx="0" cy="0"/>
+          <a:chOff x="0" y="0"/>
+          <a:chExt cx="0" cy="0"/>
+        </a:xfrm>
+      </p:grpSpPr>
+      <p:pic>
+        <p:nvPicPr>
+          <p:cNvPr id="22" name="Picture 21"/>
+          <p:cNvPicPr>
+            <a:picLocks noChangeAspect="1"/>
+          </p:cNvPicPr>
+          <p:nvPr/>
+        </p:nvPicPr>
+        <p:blipFill>
+          <a:blip r:embed="rId2"/>
+          <a:stretch>
+            <a:fillRect/>
+          </a:stretch>
+        </p:blipFill>
+        <p:spPr>
+          <a:xfrm>
+            <a:off x="5953250" y="3660419"/>
+            <a:ext cx="6064447" cy="1581556"/>
+          </a:xfrm>
+          <a:prstGeom prst="rect">
+            <a:avLst/>
+          </a:prstGeom>
+        </p:spPr>
+      </p:pic>
+      <p:sp>
+        <p:nvSpPr>
+          <p:cNvPr id="27" name="Curved Right Arrow 26"/>
+          <p:cNvSpPr/>
+          <p:nvPr/>
+        </p:nvSpPr>
+        <p:spPr>
+          <a:xfrm>
+            <a:off x="5676476" y="3010124"/>
+            <a:ext cx="577838" cy="999168"/>
+          </a:xfrm>
+          <a:prstGeom prst="curvedRightArrow">
+            <a:avLst/>
+          </a:prstGeom>
+          <a:ln>
+            <a:solidFill>
+              <a:schemeClr val="bg2">
+                <a:lumMod val="50000"/>
+              </a:schemeClr>
+            </a:solidFill>
+          </a:ln>
+        </p:spPr>
+        <p:style>
+          <a:lnRef idx="3">
+            <a:schemeClr val="lt1"/>
+          </a:lnRef>
+          <a:fillRef idx="1">
+            <a:schemeClr val="accent3"/>
+          </a:fillRef>
+          <a:effectRef idx="1">
+            <a:schemeClr val="accent3"/>
+          </a:effectRef>
+          <a:fontRef idx="minor">
+            <a:schemeClr val="lt1"/>
+          </a:fontRef>
+        </p:style>
+        <p:txBody>
+          <a:bodyPr rtlCol="0" anchor="ctr"/>
+          <a:lstStyle/>
+          <a:p>
+            <a:pPr algn="ctr"/>
+            <a:endParaRPr lang="en-US">
+              <a:solidFill>
+                <a:schemeClr val="tx1"/>
+              </a:solidFill>
+            </a:endParaRPr>
+          </a:p>
+        </p:txBody>
+      </p:sp>
+      <p:grpSp>
+        <p:nvGrpSpPr>
+          <p:cNvPr id="14" name="Group 13"/>
+          <p:cNvGrpSpPr/>
+          <p:nvPr/>
+        </p:nvGrpSpPr>
+        <p:grpSpPr>
+          <a:xfrm>
+            <a:off x="895056" y="2552114"/>
+            <a:ext cx="1230591" cy="546686"/>
+            <a:chOff x="2099603" y="2552114"/>
+            <a:chExt cx="1230591" cy="546686"/>
+          </a:xfrm>
+        </p:grpSpPr>
+        <p:pic>
+          <p:nvPicPr>
+            <p:cNvPr id="4" name="Picture 3" descr="excelfile png definición de excel celda rango etiquetas de hoja"/>
+            <p:cNvPicPr>
+              <a:picLocks noChangeAspect="1"/>
+            </p:cNvPicPr>
+            <p:nvPr/>
+          </p:nvPicPr>
+          <p:blipFill>
+            <a:blip r:embed="rId3"/>
+            <a:stretch>
+              <a:fillRect/>
+            </a:stretch>
+          </p:blipFill>
+          <p:spPr>
+            <a:xfrm>
+              <a:off x="2099603" y="2552114"/>
+              <a:ext cx="546686" cy="546686"/>
+            </a:xfrm>
+            <a:prstGeom prst="rect">
+              <a:avLst/>
+            </a:prstGeom>
+          </p:spPr>
+        </p:pic>
+        <p:sp>
+          <p:nvSpPr>
+            <p:cNvPr id="5" name="TextBox 4"/>
+            <p:cNvSpPr txBox="1"/>
+            <p:nvPr/>
+          </p:nvSpPr>
+          <p:spPr>
+            <a:xfrm>
+              <a:off x="2646289" y="2640791"/>
+              <a:ext cx="683905" cy="369332"/>
+            </a:xfrm>
+            <a:prstGeom prst="rect">
+              <a:avLst/>
+            </a:prstGeom>
+            <a:noFill/>
+          </p:spPr>
+          <p:txBody>
+            <a:bodyPr wrap="none" rtlCol="0">
+              <a:spAutoFit/>
+            </a:bodyPr>
+            <a:lstStyle/>
+            <a:p>
+              <a:r>
+                <a:rPr lang="en-US" dirty="0"/>
+                <a:t>Texas</a:t>
+              </a:r>
+            </a:p>
+          </p:txBody>
+        </p:sp>
+      </p:grpSp>
+      <p:grpSp>
+        <p:nvGrpSpPr>
+          <p:cNvPr id="15" name="Group 14"/>
+          <p:cNvGrpSpPr/>
+          <p:nvPr/>
+        </p:nvGrpSpPr>
+        <p:grpSpPr>
+          <a:xfrm>
+            <a:off x="895056" y="3202410"/>
+            <a:ext cx="1613838" cy="546686"/>
+            <a:chOff x="2099603" y="3187477"/>
+            <a:chExt cx="1613838" cy="546686"/>
+          </a:xfrm>
+        </p:grpSpPr>
+        <p:pic>
+          <p:nvPicPr>
+            <p:cNvPr id="6" name="Picture 5" descr="excelfile png definición de excel celda rango etiquetas de hoja"/>
+            <p:cNvPicPr>
+              <a:picLocks noChangeAspect="1"/>
+            </p:cNvPicPr>
+            <p:nvPr/>
+          </p:nvPicPr>
+          <p:blipFill>
+            <a:blip r:embed="rId3"/>
+            <a:stretch>
+              <a:fillRect/>
+            </a:stretch>
+          </p:blipFill>
+          <p:spPr>
+            <a:xfrm>
+              <a:off x="2099603" y="3187477"/>
+              <a:ext cx="546686" cy="546686"/>
+            </a:xfrm>
+            <a:prstGeom prst="rect">
+              <a:avLst/>
+            </a:prstGeom>
+          </p:spPr>
+        </p:pic>
+        <p:sp>
+          <p:nvSpPr>
+            <p:cNvPr id="7" name="TextBox 6"/>
+            <p:cNvSpPr txBox="1"/>
+            <p:nvPr/>
+          </p:nvSpPr>
+          <p:spPr>
+            <a:xfrm>
+              <a:off x="2646289" y="3276154"/>
+              <a:ext cx="1067152" cy="369332"/>
+            </a:xfrm>
+            <a:prstGeom prst="rect">
+              <a:avLst/>
+            </a:prstGeom>
+            <a:noFill/>
+          </p:spPr>
+          <p:txBody>
+            <a:bodyPr wrap="none" rtlCol="0">
+              <a:spAutoFit/>
+            </a:bodyPr>
+            <a:lstStyle/>
+            <a:p>
+              <a:r>
+                <a:rPr lang="en-US" dirty="0"/>
+                <a:t>New York</a:t>
+              </a:r>
+            </a:p>
+          </p:txBody>
+        </p:sp>
+      </p:grpSp>
+      <p:grpSp>
+        <p:nvGrpSpPr>
+          <p:cNvPr id="16" name="Group 15"/>
+          <p:cNvGrpSpPr/>
+          <p:nvPr/>
+        </p:nvGrpSpPr>
+        <p:grpSpPr>
+          <a:xfrm>
+            <a:off x="895056" y="3852706"/>
+            <a:ext cx="1624160" cy="546686"/>
+            <a:chOff x="2099603" y="3882572"/>
+            <a:chExt cx="1624160" cy="546686"/>
+          </a:xfrm>
+        </p:grpSpPr>
+        <p:pic>
+          <p:nvPicPr>
+            <p:cNvPr id="8" name="Picture 7" descr="excelfile png definición de excel celda rango etiquetas de hoja"/>
+            <p:cNvPicPr>
+              <a:picLocks noChangeAspect="1"/>
+            </p:cNvPicPr>
+            <p:nvPr/>
+          </p:nvPicPr>
+          <p:blipFill>
+            <a:blip r:embed="rId3"/>
+            <a:stretch>
+              <a:fillRect/>
+            </a:stretch>
+          </p:blipFill>
+          <p:spPr>
+            <a:xfrm>
+              <a:off x="2099603" y="3882572"/>
+              <a:ext cx="546686" cy="546686"/>
+            </a:xfrm>
+            <a:prstGeom prst="rect">
+              <a:avLst/>
+            </a:prstGeom>
+          </p:spPr>
+        </p:pic>
+        <p:sp>
+          <p:nvSpPr>
+            <p:cNvPr id="9" name="TextBox 8"/>
+            <p:cNvSpPr txBox="1"/>
+            <p:nvPr/>
+          </p:nvSpPr>
+          <p:spPr>
+            <a:xfrm>
+              <a:off x="2646289" y="3971249"/>
+              <a:ext cx="1077474" cy="369332"/>
+            </a:xfrm>
+            <a:prstGeom prst="rect">
+              <a:avLst/>
+            </a:prstGeom>
+            <a:noFill/>
+          </p:spPr>
+          <p:txBody>
+            <a:bodyPr wrap="none" rtlCol="0">
+              <a:spAutoFit/>
+            </a:bodyPr>
+            <a:lstStyle/>
+            <a:p>
+              <a:r>
+                <a:rPr lang="en-US" dirty="0"/>
+                <a:t>California</a:t>
+              </a:r>
+            </a:p>
+          </p:txBody>
+        </p:sp>
+      </p:grpSp>
+      <p:grpSp>
+        <p:nvGrpSpPr>
+          <p:cNvPr id="17" name="Group 16"/>
+          <p:cNvGrpSpPr/>
+          <p:nvPr/>
+        </p:nvGrpSpPr>
+        <p:grpSpPr>
+          <a:xfrm>
+            <a:off x="895056" y="4503002"/>
+            <a:ext cx="1581008" cy="546686"/>
+            <a:chOff x="2099603" y="4517935"/>
+            <a:chExt cx="1581008" cy="546686"/>
+          </a:xfrm>
+        </p:grpSpPr>
+        <p:pic>
+          <p:nvPicPr>
+            <p:cNvPr id="10" name="Picture 9" descr="excelfile png definición de excel celda rango etiquetas de hoja"/>
+            <p:cNvPicPr>
+              <a:picLocks noChangeAspect="1"/>
+            </p:cNvPicPr>
+            <p:nvPr/>
+          </p:nvPicPr>
+          <p:blipFill>
+            <a:blip r:embed="rId3"/>
+            <a:stretch>
+              <a:fillRect/>
+            </a:stretch>
+          </p:blipFill>
+          <p:spPr>
+            <a:xfrm>
+              <a:off x="2099603" y="4517935"/>
+              <a:ext cx="546686" cy="546686"/>
+            </a:xfrm>
+            <a:prstGeom prst="rect">
+              <a:avLst/>
+            </a:prstGeom>
+          </p:spPr>
+        </p:pic>
+        <p:sp>
+          <p:nvSpPr>
+            <p:cNvPr id="11" name="TextBox 10"/>
+            <p:cNvSpPr txBox="1"/>
+            <p:nvPr/>
+          </p:nvSpPr>
+          <p:spPr>
+            <a:xfrm>
+              <a:off x="2646289" y="4606612"/>
+              <a:ext cx="1034322" cy="369332"/>
+            </a:xfrm>
+            <a:prstGeom prst="rect">
+              <a:avLst/>
+            </a:prstGeom>
+            <a:noFill/>
+          </p:spPr>
+          <p:txBody>
+            <a:bodyPr wrap="none" rtlCol="0">
+              <a:spAutoFit/>
+            </a:bodyPr>
+            <a:lstStyle/>
+            <a:p>
+              <a:r>
+                <a:rPr lang="en-US" dirty="0"/>
+                <a:t>Colorado</a:t>
+              </a:r>
+            </a:p>
+          </p:txBody>
+        </p:sp>
+      </p:grpSp>
+      <p:grpSp>
+        <p:nvGrpSpPr>
+          <p:cNvPr id="18" name="Group 17"/>
+          <p:cNvGrpSpPr/>
+          <p:nvPr/>
+        </p:nvGrpSpPr>
+        <p:grpSpPr>
+          <a:xfrm>
+            <a:off x="1113089" y="5153298"/>
+            <a:ext cx="1350817" cy="546686"/>
+            <a:chOff x="2646289" y="5241975"/>
+            <a:chExt cx="1350817" cy="546686"/>
+          </a:xfrm>
+        </p:grpSpPr>
+        <p:pic>
+          <p:nvPicPr>
+            <p:cNvPr id="12" name="Picture 11" descr="excelfile png definición de excel celda rango etiquetas de hoja"/>
+            <p:cNvPicPr>
+              <a:picLocks noChangeAspect="1"/>
+            </p:cNvPicPr>
+            <p:nvPr/>
+          </p:nvPicPr>
+          <p:blipFill>
+            <a:blip r:embed="rId3"/>
+            <a:stretch>
+              <a:fillRect/>
+            </a:stretch>
+          </p:blipFill>
+          <p:spPr>
+            <a:xfrm>
+              <a:off x="3450420" y="5241975"/>
+              <a:ext cx="546686" cy="546686"/>
+            </a:xfrm>
+            <a:prstGeom prst="rect">
+              <a:avLst/>
+            </a:prstGeom>
+          </p:spPr>
+        </p:pic>
+        <p:sp>
+          <p:nvSpPr>
+            <p:cNvPr id="13" name="TextBox 12"/>
+            <p:cNvSpPr txBox="1"/>
+            <p:nvPr/>
+          </p:nvSpPr>
+          <p:spPr>
+            <a:xfrm>
+              <a:off x="2646289" y="5330652"/>
+              <a:ext cx="798617" cy="369332"/>
+            </a:xfrm>
+            <a:prstGeom prst="rect">
+              <a:avLst/>
+            </a:prstGeom>
+            <a:noFill/>
+          </p:spPr>
+          <p:txBody>
+            <a:bodyPr wrap="none" rtlCol="0">
+              <a:spAutoFit/>
+            </a:bodyPr>
+            <a:lstStyle/>
+            <a:p>
+              <a:r>
+                <a:rPr lang="en-US" dirty="0"/>
+                <a:t>… + 46</a:t>
+              </a:r>
+            </a:p>
+          </p:txBody>
+        </p:sp>
+      </p:grpSp>
+      <p:sp>
+        <p:nvSpPr>
+          <p:cNvPr id="19" name="Right Brace 18"/>
+          <p:cNvSpPr/>
+          <p:nvPr/>
+        </p:nvSpPr>
+        <p:spPr>
+          <a:xfrm>
+            <a:off x="2508894" y="2350003"/>
+            <a:ext cx="756138" cy="3552092"/>
+          </a:xfrm>
+          <a:prstGeom prst="rightBrace">
+            <a:avLst/>
+          </a:prstGeom>
+          <a:ln>
+            <a:solidFill>
+              <a:schemeClr val="accent1">
+                <a:lumMod val="20000"/>
+                <a:lumOff val="80000"/>
+              </a:schemeClr>
+            </a:solidFill>
+          </a:ln>
+        </p:spPr>
+        <p:style>
+          <a:lnRef idx="3">
+            <a:schemeClr val="accent6"/>
+          </a:lnRef>
+          <a:fillRef idx="0">
+            <a:schemeClr val="accent6"/>
+          </a:fillRef>
+          <a:effectRef idx="2">
+            <a:schemeClr val="accent6"/>
+          </a:effectRef>
+          <a:fontRef idx="minor">
+            <a:schemeClr val="tx1"/>
+          </a:fontRef>
+        </p:style>
+        <p:txBody>
+          <a:bodyPr rtlCol="0" anchor="ctr"/>
+          <a:lstStyle/>
+          <a:p>
+            <a:pPr algn="ctr"/>
+            <a:endParaRPr lang="en-US"/>
+          </a:p>
+        </p:txBody>
+      </p:sp>
+      <p:sp>
+        <p:nvSpPr>
+          <p:cNvPr id="20" name="Oval 19"/>
+          <p:cNvSpPr/>
+          <p:nvPr/>
+        </p:nvSpPr>
+        <p:spPr>
+          <a:xfrm>
+            <a:off x="3431977" y="3357727"/>
+            <a:ext cx="1536644" cy="1536644"/>
+          </a:xfrm>
+          <a:prstGeom prst="ellipse">
+            <a:avLst/>
+          </a:prstGeom>
+        </p:spPr>
+        <p:style>
+          <a:lnRef idx="1">
+            <a:schemeClr val="dk1"/>
+          </a:lnRef>
+          <a:fillRef idx="3">
+            <a:schemeClr val="dk1"/>
+          </a:fillRef>
+          <a:effectRef idx="2">
+            <a:schemeClr val="dk1"/>
+          </a:effectRef>
+          <a:fontRef idx="minor">
+            <a:schemeClr val="lt1"/>
+          </a:fontRef>
+        </p:style>
+        <p:txBody>
+          <a:bodyPr rtlCol="0" anchor="ctr"/>
+          <a:lstStyle/>
+          <a:p>
+            <a:pPr algn="ctr"/>
+            <a:r>
+              <a:rPr lang="en-US" dirty="0"/>
+              <a:t>Process</a:t>
+            </a:r>
+          </a:p>
+        </p:txBody>
+      </p:sp>
+      <p:sp>
+        <p:nvSpPr>
+          <p:cNvPr id="21" name="Left Brace 20"/>
+          <p:cNvSpPr/>
+          <p:nvPr/>
+        </p:nvSpPr>
+        <p:spPr>
+          <a:xfrm>
+            <a:off x="5135566" y="2328022"/>
+            <a:ext cx="817684" cy="3596053"/>
+          </a:xfrm>
+          <a:prstGeom prst="leftBrace">
+            <a:avLst/>
+          </a:prstGeom>
+          <a:ln>
+            <a:solidFill>
+              <a:schemeClr val="accent1">
+                <a:lumMod val="20000"/>
+                <a:lumOff val="80000"/>
+              </a:schemeClr>
+            </a:solidFill>
+          </a:ln>
+        </p:spPr>
+        <p:style>
+          <a:lnRef idx="3">
+            <a:schemeClr val="accent6"/>
+          </a:lnRef>
+          <a:fillRef idx="0">
+            <a:schemeClr val="accent6"/>
+          </a:fillRef>
+          <a:effectRef idx="2">
+            <a:schemeClr val="accent6"/>
+          </a:effectRef>
+          <a:fontRef idx="minor">
+            <a:schemeClr val="tx1"/>
+          </a:fontRef>
+        </p:style>
+        <p:txBody>
+          <a:bodyPr rtlCol="0" anchor="ctr"/>
+          <a:lstStyle/>
+          <a:p>
+            <a:pPr algn="ctr"/>
+            <a:endParaRPr lang="en-US"/>
+          </a:p>
+        </p:txBody>
+      </p:sp>
+      <p:grpSp>
+        <p:nvGrpSpPr>
+          <p:cNvPr id="23" name="Group 22"/>
+          <p:cNvGrpSpPr/>
+          <p:nvPr/>
+        </p:nvGrpSpPr>
+        <p:grpSpPr>
+          <a:xfrm>
+            <a:off x="5953250" y="2652515"/>
+            <a:ext cx="3159132" cy="546686"/>
+            <a:chOff x="2099603" y="2552114"/>
+            <a:chExt cx="3159132" cy="546686"/>
+          </a:xfrm>
+        </p:grpSpPr>
+        <p:pic>
+          <p:nvPicPr>
+            <p:cNvPr id="24" name="Picture 23" descr="excelfile png definición de excel celda rango etiquetas de hoja"/>
+            <p:cNvPicPr>
+              <a:picLocks noChangeAspect="1"/>
+            </p:cNvPicPr>
+            <p:nvPr/>
+          </p:nvPicPr>
+          <p:blipFill>
+            <a:blip r:embed="rId3"/>
+            <a:stretch>
+              <a:fillRect/>
+            </a:stretch>
+          </p:blipFill>
+          <p:spPr>
+            <a:xfrm>
+              <a:off x="2099603" y="2552114"/>
+              <a:ext cx="546686" cy="546686"/>
+            </a:xfrm>
+            <a:prstGeom prst="rect">
+              <a:avLst/>
+            </a:prstGeom>
+          </p:spPr>
+        </p:pic>
+        <p:sp>
+          <p:nvSpPr>
+            <p:cNvPr id="25" name="TextBox 24"/>
+            <p:cNvSpPr txBox="1"/>
+            <p:nvPr/>
+          </p:nvSpPr>
+          <p:spPr>
+            <a:xfrm>
+              <a:off x="2646289" y="2640791"/>
+              <a:ext cx="2612446" cy="369332"/>
+            </a:xfrm>
+            <a:prstGeom prst="rect">
+              <a:avLst/>
+            </a:prstGeom>
+            <a:noFill/>
+          </p:spPr>
+          <p:txBody>
+            <a:bodyPr wrap="none" rtlCol="0">
+              <a:spAutoFit/>
+            </a:bodyPr>
+            <a:lstStyle/>
+            <a:p>
+              <a:r>
+                <a:rPr lang="en-US" dirty="0"/>
+                <a:t>Consolidated List of Leads</a:t>
+              </a:r>
+            </a:p>
+          </p:txBody>
+        </p:sp>
+      </p:grpSp>
+      <p:sp>
+        <p:nvSpPr>
+          <p:cNvPr id="28" name="TextBox 27"/>
+          <p:cNvSpPr txBox="1"/>
+          <p:nvPr/>
+        </p:nvSpPr>
+        <p:spPr>
+          <a:xfrm>
+            <a:off x="1216847" y="1619907"/>
+            <a:ext cx="992579" cy="461665"/>
+          </a:xfrm>
+          <a:prstGeom prst="rect">
+            <a:avLst/>
+          </a:prstGeom>
+          <a:noFill/>
+        </p:spPr>
+        <p:txBody>
+          <a:bodyPr wrap="none" rtlCol="0">
+            <a:spAutoFit/>
+          </a:bodyPr>
+          <a:lstStyle/>
+          <a:p>
+            <a:r>
+              <a:rPr lang="en-US" sz="2400" b="1" dirty="0"/>
+              <a:t>Inputs</a:t>
+            </a:r>
+          </a:p>
+        </p:txBody>
+      </p:sp>
+      <p:sp>
+        <p:nvSpPr>
+          <p:cNvPr id="29" name="TextBox 28"/>
+          <p:cNvSpPr txBox="1"/>
+          <p:nvPr/>
+        </p:nvSpPr>
+        <p:spPr>
+          <a:xfrm>
+            <a:off x="6054596" y="1618967"/>
+            <a:ext cx="1226618" cy="461665"/>
+          </a:xfrm>
+          <a:prstGeom prst="rect">
+            <a:avLst/>
+          </a:prstGeom>
+          <a:noFill/>
+        </p:spPr>
+        <p:txBody>
+          <a:bodyPr wrap="none" rtlCol="0">
+            <a:spAutoFit/>
+          </a:bodyPr>
+          <a:lstStyle/>
+          <a:p>
+            <a:r>
+              <a:rPr lang="en-US" sz="2400" b="1" dirty="0"/>
+              <a:t>Outputs</a:t>
+            </a:r>
+          </a:p>
+        </p:txBody>
+      </p:sp>
+      <p:sp>
+        <p:nvSpPr>
+          <p:cNvPr id="2" name="Title 1"/>
+          <p:cNvSpPr>
+            <a:spLocks noGrp="1"/>
+          </p:cNvSpPr>
+          <p:nvPr>
+            <p:ph type="title"/>
+          </p:nvPr>
+        </p:nvSpPr>
+        <p:spPr/>
+        <p:txBody>
+          <a:bodyPr/>
+          <a:lstStyle/>
+          <a:p>
+            <a:r>
+              <a:rPr lang="en-US" dirty="0"/>
+              <a:t>Defining what we want</a:t>
+            </a:r>
+          </a:p>
+        </p:txBody>
+      </p:sp>
+    </p:spTree>
+    <p:extLst>
+      <p:ext uri="{BB962C8B-B14F-4D97-AF65-F5344CB8AC3E}">
+        <p14:creationId xmlns:p14="http://schemas.microsoft.com/office/powerpoint/2010/main" val="2521872920"/>
+      </p:ext>
+    </p:extLst>
+  </p:cSld>
+  <p:clrMapOvr>
+    <a:masterClrMapping/>
+  </p:clrMapOvr>
+</p:sld>
+</file>
+
+<file path=ppt/slides/slide3.xml><?xml version="1.0" encoding="utf-8"?>
+<p:sld xmlns:a="http://schemas.openxmlformats.org/drawingml/2006/main" xmlns:r="http://schemas.openxmlformats.org/officeDocument/2006/relationships" xmlns:p="http://schemas.openxmlformats.org/presentationml/2006/main">
+  <p:cSld>
+    <p:spTree>
+      <p:nvGrpSpPr>
+        <p:cNvPr id="1" name=""/>
+        <p:cNvGrpSpPr/>
+        <p:nvPr/>
+      </p:nvGrpSpPr>
+      <p:grpSpPr>
+        <a:xfrm>
+          <a:off x="0" y="0"/>
+          <a:ext cx="0" cy="0"/>
+          <a:chOff x="0" y="0"/>
+          <a:chExt cx="0" cy="0"/>
+        </a:xfrm>
+      </p:grpSpPr>
+      <p:sp>
+        <p:nvSpPr>
+          <p:cNvPr id="2" name="Title 1"/>
+          <p:cNvSpPr>
+            <a:spLocks noGrp="1"/>
+          </p:cNvSpPr>
+          <p:nvPr>
+            <p:ph type="title"/>
+          </p:nvPr>
+        </p:nvSpPr>
+        <p:spPr/>
+        <p:txBody>
+          <a:bodyPr/>
+          <a:lstStyle/>
+          <a:p>
+            <a:r>
+              <a:rPr lang="en-US" dirty="0"/>
+              <a:t>Process Flow</a:t>
+            </a:r>
+          </a:p>
+        </p:txBody>
+      </p:sp>
+      <p:sp>
+        <p:nvSpPr>
+          <p:cNvPr id="3" name="Content Placeholder 2"/>
+          <p:cNvSpPr>
+            <a:spLocks noGrp="1"/>
+          </p:cNvSpPr>
+          <p:nvPr>
+            <p:ph idx="1"/>
+          </p:nvPr>
+        </p:nvSpPr>
+        <p:spPr/>
+        <p:txBody>
+          <a:bodyPr/>
+          <a:lstStyle/>
+          <a:p>
+            <a:endParaRPr lang="en-US" dirty="0"/>
+          </a:p>
+        </p:txBody>
+      </p:sp>
+    </p:spTree>
+    <p:extLst>
+      <p:ext uri="{BB962C8B-B14F-4D97-AF65-F5344CB8AC3E}">
+        <p14:creationId xmlns:p14="http://schemas.microsoft.com/office/powerpoint/2010/main" val="3815960845"/>
+      </p:ext>
+    </p:extLst>
+  </p:cSld>
+  <p:clrMapOvr>
+    <a:masterClrMapping/>
+  </p:clrMapOvr>
+</p:sld>
+</file>
+
+<file path=ppt/slides/slide4.xml><?xml version="1.0" encoding="utf-8"?>
+<p:sld xmlns:a="http://schemas.openxmlformats.org/drawingml/2006/main" xmlns:r="http://schemas.openxmlformats.org/officeDocument/2006/relationships" xmlns:p="http://schemas.openxmlformats.org/presentationml/2006/main">
+  <p:cSld>
+    <p:spTree>
+      <p:nvGrpSpPr>
+        <p:cNvPr id="1" name=""/>
+        <p:cNvGrpSpPr/>
+        <p:nvPr/>
+      </p:nvGrpSpPr>
+      <p:grpSpPr>
+        <a:xfrm>
+          <a:off x="0" y="0"/>
+          <a:ext cx="0" cy="0"/>
+          <a:chOff x="0" y="0"/>
+          <a:chExt cx="0" cy="0"/>
+        </a:xfrm>
+      </p:grpSpPr>
+      <p:sp>
+        <p:nvSpPr>
+          <p:cNvPr id="2" name="Title 1"/>
+          <p:cNvSpPr>
+            <a:spLocks noGrp="1"/>
+          </p:cNvSpPr>
+          <p:nvPr>
+            <p:ph type="title"/>
+          </p:nvPr>
+        </p:nvSpPr>
+        <p:spPr/>
+        <p:txBody>
+          <a:bodyPr/>
+          <a:lstStyle/>
+          <a:p>
+            <a:r>
+              <a:rPr lang="es-ES" dirty="0"/>
+              <a:t>Case 1</a:t>
+            </a:r>
+            <a:endParaRPr lang="en-US" dirty="0"/>
+          </a:p>
+        </p:txBody>
+      </p:sp>
+      <p:pic>
+        <p:nvPicPr>
+          <p:cNvPr id="4" name="Picture 3"/>
+          <p:cNvPicPr>
+            <a:picLocks noChangeAspect="1"/>
+          </p:cNvPicPr>
+          <p:nvPr/>
+        </p:nvPicPr>
+        <p:blipFill>
+          <a:blip r:embed="rId2"/>
+          <a:stretch>
+            <a:fillRect/>
+          </a:stretch>
+        </p:blipFill>
+        <p:spPr>
+          <a:xfrm>
+            <a:off x="4304474" y="544530"/>
+            <a:ext cx="7185140" cy="2389014"/>
+          </a:xfrm>
+          <a:prstGeom prst="rect">
+            <a:avLst/>
+          </a:prstGeom>
+        </p:spPr>
+      </p:pic>
+      <p:sp>
+        <p:nvSpPr>
+          <p:cNvPr id="5" name="TextBox 4"/>
+          <p:cNvSpPr txBox="1"/>
+          <p:nvPr/>
+        </p:nvSpPr>
+        <p:spPr>
+          <a:xfrm>
+            <a:off x="591451" y="3052455"/>
+            <a:ext cx="10898163" cy="2862322"/>
+          </a:xfrm>
+          <a:prstGeom prst="rect">
+            <a:avLst/>
+          </a:prstGeom>
+          <a:noFill/>
+        </p:spPr>
+        <p:txBody>
+          <a:bodyPr wrap="square" rtlCol="0">
+            <a:spAutoFit/>
+          </a:bodyPr>
+          <a:lstStyle/>
+          <a:p>
+            <a:r>
+              <a:rPr lang="en-US" dirty="0"/>
+              <a:t>We’ll start by taking files that are already formatted the way we want and consolidating them into one file. There’s a couple of things we’ll need to know about to do this:</a:t>
+            </a:r>
+          </a:p>
+          <a:p>
+            <a:pPr marL="285750" indent="-285750">
+              <a:buFont typeface="Arial" panose="020B0604020202020204" pitchFamily="34" charset="0"/>
+              <a:buChar char="•"/>
+            </a:pPr>
+            <a:r>
+              <a:rPr lang="en-US" dirty="0"/>
+              <a:t>Reading a directory with </a:t>
+            </a:r>
+            <a:r>
+              <a:rPr lang="en-US" dirty="0" err="1"/>
+              <a:t>fs.readdir</a:t>
+            </a:r>
+            <a:endParaRPr lang="en-US" dirty="0"/>
+          </a:p>
+          <a:p>
+            <a:pPr marL="285750" indent="-285750">
+              <a:buFont typeface="Arial" panose="020B0604020202020204" pitchFamily="34" charset="0"/>
+              <a:buChar char="•"/>
+            </a:pPr>
+            <a:r>
+              <a:rPr lang="en-US" dirty="0"/>
+              <a:t>Reading a file with </a:t>
+            </a:r>
+            <a:r>
+              <a:rPr lang="en-US" dirty="0" err="1"/>
+              <a:t>fs.readFile</a:t>
+            </a:r>
+            <a:endParaRPr lang="en-US" dirty="0"/>
+          </a:p>
+          <a:p>
+            <a:pPr marL="285750" indent="-285750">
+              <a:buFont typeface="Arial" panose="020B0604020202020204" pitchFamily="34" charset="0"/>
+              <a:buChar char="•"/>
+            </a:pPr>
+            <a:r>
+              <a:rPr lang="en-US" dirty="0"/>
+              <a:t>Writing a file with </a:t>
+            </a:r>
+            <a:r>
+              <a:rPr lang="en-US" dirty="0" err="1"/>
+              <a:t>fs.writeFile</a:t>
+            </a:r>
+            <a:endParaRPr lang="en-US" dirty="0"/>
+          </a:p>
+          <a:p>
+            <a:pPr marL="285750" indent="-285750">
+              <a:buFont typeface="Arial" panose="020B0604020202020204" pitchFamily="34" charset="0"/>
+              <a:buChar char="•"/>
+            </a:pPr>
+            <a:endParaRPr lang="en-US" dirty="0"/>
+          </a:p>
+          <a:p>
+            <a:r>
+              <a:rPr lang="en-US" dirty="0"/>
+              <a:t>When we complete this case, we’ll have the bulk of automation handled as long as all team members give us the information we want in exactly the format we want it in. The solution is scalable for any number of files. This can save you a lot of time or would be a necessity depending on the scale you are working with, especially if you wanted to consolidate say 1,000 files or 10,000 for that matter. </a:t>
+            </a:r>
+          </a:p>
+        </p:txBody>
+      </p:sp>
+    </p:spTree>
+    <p:extLst>
+      <p:ext uri="{BB962C8B-B14F-4D97-AF65-F5344CB8AC3E}">
+        <p14:creationId xmlns:p14="http://schemas.microsoft.com/office/powerpoint/2010/main" val="2413513629"/>
+      </p:ext>
+    </p:extLst>
+  </p:cSld>
+  <p:clrMapOvr>
+    <a:masterClrMapping/>
+  </p:clrMapOvr>
+</p:sld>
+</file>
+
+<file path=ppt/slides/slide5.xml><?xml version="1.0" encoding="utf-8"?>
+<p:sld xmlns:a="http://schemas.openxmlformats.org/drawingml/2006/main" xmlns:r="http://schemas.openxmlformats.org/officeDocument/2006/relationships" xmlns:p="http://schemas.openxmlformats.org/presentationml/2006/main">
+  <p:cSld>
+    <p:spTree>
+      <p:nvGrpSpPr>
+        <p:cNvPr id="1" name=""/>
+        <p:cNvGrpSpPr/>
+        <p:nvPr/>
+      </p:nvGrpSpPr>
+      <p:grpSpPr>
+        <a:xfrm>
+          <a:off x="0" y="0"/>
+          <a:ext cx="0" cy="0"/>
+          <a:chOff x="0" y="0"/>
+          <a:chExt cx="0" cy="0"/>
+        </a:xfrm>
+      </p:grpSpPr>
+      <p:sp>
+        <p:nvSpPr>
+          <p:cNvPr id="2" name="Title 1"/>
+          <p:cNvSpPr>
+            <a:spLocks noGrp="1"/>
+          </p:cNvSpPr>
+          <p:nvPr>
+            <p:ph type="title"/>
+          </p:nvPr>
+        </p:nvSpPr>
+        <p:spPr/>
+        <p:txBody>
+          <a:bodyPr/>
+          <a:lstStyle/>
+          <a:p>
+            <a:r>
+              <a:rPr lang="en-US" dirty="0"/>
+              <a:t>Section 1 | Listing</a:t>
+            </a:r>
+          </a:p>
+        </p:txBody>
+      </p:sp>
+      <p:sp>
+        <p:nvSpPr>
+          <p:cNvPr id="3" name="Content Placeholder 2"/>
+          <p:cNvSpPr>
+            <a:spLocks noGrp="1"/>
+          </p:cNvSpPr>
+          <p:nvPr>
+            <p:ph idx="1"/>
+          </p:nvPr>
+        </p:nvSpPr>
+        <p:spPr>
+          <a:xfrm>
+            <a:off x="685801" y="2142067"/>
+            <a:ext cx="4259178" cy="3649133"/>
+          </a:xfrm>
+        </p:spPr>
+        <p:txBody>
+          <a:bodyPr/>
+          <a:lstStyle/>
+          <a:p>
+            <a:r>
+              <a:rPr lang="en-US" dirty="0"/>
+              <a:t>Require the fs module</a:t>
+            </a:r>
+          </a:p>
+          <a:p>
+            <a:r>
+              <a:rPr lang="en-US" dirty="0"/>
+              <a:t>Define constants</a:t>
+            </a:r>
+          </a:p>
+          <a:p>
+            <a:endParaRPr lang="en-US" dirty="0"/>
+          </a:p>
+        </p:txBody>
+      </p:sp>
+      <p:pic>
+        <p:nvPicPr>
+          <p:cNvPr id="5" name="Picture 4"/>
+          <p:cNvPicPr>
+            <a:picLocks noChangeAspect="1"/>
+          </p:cNvPicPr>
+          <p:nvPr/>
+        </p:nvPicPr>
+        <p:blipFill>
+          <a:blip r:embed="rId3"/>
+          <a:stretch>
+            <a:fillRect/>
+          </a:stretch>
+        </p:blipFill>
+        <p:spPr>
+          <a:xfrm>
+            <a:off x="3595531" y="2261023"/>
+            <a:ext cx="7800569" cy="1809936"/>
+          </a:xfrm>
+          <a:prstGeom prst="rect">
+            <a:avLst/>
+          </a:prstGeom>
+        </p:spPr>
+      </p:pic>
+    </p:spTree>
+    <p:extLst>
+      <p:ext uri="{BB962C8B-B14F-4D97-AF65-F5344CB8AC3E}">
+        <p14:creationId xmlns:p14="http://schemas.microsoft.com/office/powerpoint/2010/main" val="2918616612"/>
+      </p:ext>
+    </p:extLst>
+  </p:cSld>
+  <p:clrMapOvr>
+    <a:masterClrMapping/>
+  </p:clrMapOvr>
+</p:sld>
+</file>
+
+<file path=ppt/slides/slide6.xml><?xml version="1.0" encoding="utf-8"?>
+<p:sld xmlns:a="http://schemas.openxmlformats.org/drawingml/2006/main" xmlns:r="http://schemas.openxmlformats.org/officeDocument/2006/relationships" xmlns:p="http://schemas.openxmlformats.org/presentationml/2006/main">
+  <p:cSld>
+    <p:spTree>
+      <p:nvGrpSpPr>
+        <p:cNvPr id="1" name=""/>
+        <p:cNvGrpSpPr/>
+        <p:nvPr/>
+      </p:nvGrpSpPr>
+      <p:grpSpPr>
+        <a:xfrm>
+          <a:off x="0" y="0"/>
+          <a:ext cx="0" cy="0"/>
+          <a:chOff x="0" y="0"/>
+          <a:chExt cx="0" cy="0"/>
+        </a:xfrm>
+      </p:grpSpPr>
+      <p:sp>
+        <p:nvSpPr>
+          <p:cNvPr id="2" name="Title 1"/>
+          <p:cNvSpPr>
+            <a:spLocks noGrp="1"/>
+          </p:cNvSpPr>
+          <p:nvPr>
+            <p:ph type="title"/>
+          </p:nvPr>
+        </p:nvSpPr>
+        <p:spPr/>
+        <p:txBody>
+          <a:bodyPr/>
+          <a:lstStyle/>
+          <a:p>
+            <a:r>
+              <a:rPr lang="en-US" dirty="0"/>
+              <a:t>Section 1 | Sidebar – naming convention, using variables, string concatenation</a:t>
+            </a:r>
+          </a:p>
+        </p:txBody>
+      </p:sp>
+      <p:grpSp>
+        <p:nvGrpSpPr>
+          <p:cNvPr id="14" name="Group 13"/>
+          <p:cNvGrpSpPr/>
+          <p:nvPr/>
+        </p:nvGrpSpPr>
+        <p:grpSpPr>
+          <a:xfrm>
+            <a:off x="142958" y="3056280"/>
+            <a:ext cx="11796025" cy="3801720"/>
+            <a:chOff x="55276" y="2298583"/>
+            <a:chExt cx="11796025" cy="3801720"/>
+          </a:xfrm>
+        </p:grpSpPr>
+        <p:pic>
+          <p:nvPicPr>
+            <p:cNvPr id="5" name="Picture 4"/>
+            <p:cNvPicPr>
+              <a:picLocks noChangeAspect="1"/>
+            </p:cNvPicPr>
+            <p:nvPr/>
+          </p:nvPicPr>
+          <p:blipFill rotWithShape="1">
+            <a:blip r:embed="rId2"/>
+            <a:srcRect b="6314"/>
+            <a:stretch/>
+          </p:blipFill>
+          <p:spPr>
+            <a:xfrm>
+              <a:off x="4132575" y="2298583"/>
+              <a:ext cx="7718726" cy="3050031"/>
+            </a:xfrm>
+            <a:prstGeom prst="rect">
+              <a:avLst/>
+            </a:prstGeom>
+          </p:spPr>
+        </p:pic>
+        <p:cxnSp>
+          <p:nvCxnSpPr>
+            <p:cNvPr id="7" name="Straight Arrow Connector 6"/>
+            <p:cNvCxnSpPr/>
+            <p:nvPr/>
+          </p:nvCxnSpPr>
+          <p:spPr>
+            <a:xfrm flipH="1">
+              <a:off x="3419605" y="4546499"/>
+              <a:ext cx="1047909" cy="0"/>
+            </a:xfrm>
+            <a:prstGeom prst="straightConnector1">
+              <a:avLst/>
+            </a:prstGeom>
+            <a:ln>
+              <a:tailEnd type="triangle"/>
+            </a:ln>
+          </p:spPr>
+          <p:style>
+            <a:lnRef idx="1">
+              <a:schemeClr val="accent1"/>
+            </a:lnRef>
+            <a:fillRef idx="0">
+              <a:schemeClr val="accent1"/>
+            </a:fillRef>
+            <a:effectRef idx="0">
+              <a:schemeClr val="accent1"/>
+            </a:effectRef>
+            <a:fontRef idx="minor">
+              <a:schemeClr val="tx1"/>
+            </a:fontRef>
+          </p:style>
+        </p:cxnSp>
+        <p:sp>
+          <p:nvSpPr>
+            <p:cNvPr id="10" name="Rectangle 9"/>
+            <p:cNvSpPr/>
+            <p:nvPr/>
+          </p:nvSpPr>
+          <p:spPr>
+            <a:xfrm>
+              <a:off x="55276" y="4123126"/>
+              <a:ext cx="3175400" cy="646331"/>
+            </a:xfrm>
+            <a:prstGeom prst="rect">
+              <a:avLst/>
+            </a:prstGeom>
+          </p:spPr>
+          <p:txBody>
+            <a:bodyPr wrap="square">
+              <a:spAutoFit/>
+            </a:bodyPr>
+            <a:lstStyle/>
+            <a:p>
+              <a:pPr algn="r"/>
+              <a:r>
+                <a:rPr lang="en-US" dirty="0">
+                  <a:latin typeface="Calibri" panose="020F0502020204030204" pitchFamily="34" charset="0"/>
+                  <a:cs typeface="Courier New" panose="02070309020205020404" pitchFamily="49" charset="0"/>
+                </a:rPr>
+                <a:t>stored value is </a:t>
+              </a:r>
+              <a:br>
+                <a:rPr lang="en-US" dirty="0">
+                  <a:latin typeface="Calibri" panose="020F0502020204030204" pitchFamily="34" charset="0"/>
+                  <a:cs typeface="Courier New" panose="02070309020205020404" pitchFamily="49" charset="0"/>
+                </a:rPr>
+              </a:br>
+              <a:r>
+                <a:rPr lang="en-US" dirty="0">
+                  <a:latin typeface="Courier New" panose="02070309020205020404" pitchFamily="49" charset="0"/>
+                  <a:cs typeface="Courier New" panose="02070309020205020404" pitchFamily="49" charset="0"/>
+                </a:rPr>
+                <a:t>“Texas_GregAbbot.csv”</a:t>
+              </a:r>
+            </a:p>
+          </p:txBody>
+        </p:sp>
+        <p:sp>
+          <p:nvSpPr>
+            <p:cNvPr id="11" name="Rectangle 10"/>
+            <p:cNvSpPr/>
+            <p:nvPr/>
+          </p:nvSpPr>
+          <p:spPr>
+            <a:xfrm>
+              <a:off x="5493657" y="5453972"/>
+              <a:ext cx="4113803" cy="646331"/>
+            </a:xfrm>
+            <a:prstGeom prst="rect">
+              <a:avLst/>
+            </a:prstGeom>
+          </p:spPr>
+          <p:txBody>
+            <a:bodyPr wrap="square">
+              <a:spAutoFit/>
+            </a:bodyPr>
+            <a:lstStyle/>
+            <a:p>
+              <a:pPr algn="r"/>
+              <a:r>
+                <a:rPr lang="en-US" dirty="0">
+                  <a:latin typeface="Calibri" panose="020F0502020204030204" pitchFamily="34" charset="0"/>
+                  <a:cs typeface="Courier New" panose="02070309020205020404" pitchFamily="49" charset="0"/>
+                </a:rPr>
+                <a:t>argument passed: </a:t>
+              </a:r>
+              <a:br>
+                <a:rPr lang="en-US" dirty="0">
+                  <a:latin typeface="Calibri" panose="020F0502020204030204" pitchFamily="34" charset="0"/>
+                  <a:cs typeface="Courier New" panose="02070309020205020404" pitchFamily="49" charset="0"/>
+                </a:rPr>
+              </a:br>
+              <a:r>
+                <a:rPr lang="en-US" dirty="0">
+                  <a:latin typeface="Courier New" panose="02070309020205020404" pitchFamily="49" charset="0"/>
+                  <a:cs typeface="Courier New" panose="02070309020205020404" pitchFamily="49" charset="0"/>
+                </a:rPr>
+                <a:t>“data/Texas_GregAbbot.csv”</a:t>
+              </a:r>
+            </a:p>
+          </p:txBody>
+        </p:sp>
+        <p:sp>
+          <p:nvSpPr>
+            <p:cNvPr id="12" name="Right Brace 11"/>
+            <p:cNvSpPr/>
+            <p:nvPr/>
+          </p:nvSpPr>
+          <p:spPr>
+            <a:xfrm rot="5400000">
+              <a:off x="8630433" y="4083489"/>
+              <a:ext cx="288097" cy="2367419"/>
+            </a:xfrm>
+            <a:prstGeom prst="rightBrace">
+              <a:avLst>
+                <a:gd name="adj1" fmla="val 8333"/>
+                <a:gd name="adj2" fmla="val 52081"/>
+              </a:avLst>
+            </a:prstGeom>
+          </p:spPr>
+          <p:style>
+            <a:lnRef idx="1">
+              <a:schemeClr val="accent1"/>
+            </a:lnRef>
+            <a:fillRef idx="0">
+              <a:schemeClr val="accent1"/>
+            </a:fillRef>
+            <a:effectRef idx="0">
+              <a:schemeClr val="accent1"/>
+            </a:effectRef>
+            <a:fontRef idx="minor">
+              <a:schemeClr val="tx1"/>
+            </a:fontRef>
+          </p:style>
+          <p:txBody>
+            <a:bodyPr rtlCol="0" anchor="ctr"/>
+            <a:lstStyle/>
+            <a:p>
+              <a:pPr algn="ctr"/>
+              <a:endParaRPr lang="en-US"/>
+            </a:p>
+          </p:txBody>
+        </p:sp>
+      </p:grpSp>
+      <p:sp>
+        <p:nvSpPr>
+          <p:cNvPr id="13" name="Rectangle 12"/>
+          <p:cNvSpPr/>
+          <p:nvPr/>
+        </p:nvSpPr>
+        <p:spPr>
+          <a:xfrm>
+            <a:off x="685801" y="2114012"/>
+            <a:ext cx="4136720" cy="2585323"/>
+          </a:xfrm>
+          <a:prstGeom prst="rect">
+            <a:avLst/>
+          </a:prstGeom>
+        </p:spPr>
+        <p:txBody>
+          <a:bodyPr wrap="square">
+            <a:spAutoFit/>
+          </a:bodyPr>
+          <a:lstStyle/>
+          <a:p>
+            <a:r>
+              <a:rPr lang="en-US" dirty="0"/>
+              <a:t>These include our the path to our files, and the file extension we are expecting. And the file name.  It’s important that our input files use filenames that follow a convention. </a:t>
+            </a:r>
+          </a:p>
+          <a:p>
+            <a:endParaRPr lang="en-US" dirty="0"/>
+          </a:p>
+          <a:p>
+            <a:r>
+              <a:rPr lang="en-US" dirty="0"/>
+              <a:t>I’ve broken up the file name across constants to illustrate the naming convention I’ve chosen for this exercise. </a:t>
+            </a:r>
+          </a:p>
+        </p:txBody>
+      </p:sp>
+    </p:spTree>
+    <p:extLst>
+      <p:ext uri="{BB962C8B-B14F-4D97-AF65-F5344CB8AC3E}">
+        <p14:creationId xmlns:p14="http://schemas.microsoft.com/office/powerpoint/2010/main" val="3252158849"/>
+      </p:ext>
+    </p:extLst>
+  </p:cSld>
+  <p:clrMapOvr>
+    <a:masterClrMapping/>
+  </p:clrMapOvr>
+</p:sld>
+</file>
+
+<file path=ppt/slides/slide7.xml><?xml version="1.0" encoding="utf-8"?>
+<p:sld xmlns:a="http://schemas.openxmlformats.org/drawingml/2006/main" xmlns:r="http://schemas.openxmlformats.org/officeDocument/2006/relationships" xmlns:p="http://schemas.openxmlformats.org/presentationml/2006/main">
+  <p:cSld>
+    <p:spTree>
+      <p:nvGrpSpPr>
+        <p:cNvPr id="1" name=""/>
+        <p:cNvGrpSpPr/>
+        <p:nvPr/>
+      </p:nvGrpSpPr>
+      <p:grpSpPr>
+        <a:xfrm>
+          <a:off x="0" y="0"/>
+          <a:ext cx="0" cy="0"/>
+          <a:chOff x="0" y="0"/>
+          <a:chExt cx="0" cy="0"/>
+        </a:xfrm>
+      </p:grpSpPr>
+      <p:sp>
+        <p:nvSpPr>
+          <p:cNvPr id="2" name="Title 1"/>
+          <p:cNvSpPr>
+            <a:spLocks noGrp="1"/>
+          </p:cNvSpPr>
+          <p:nvPr>
+            <p:ph type="title"/>
+          </p:nvPr>
+        </p:nvSpPr>
+        <p:spPr/>
+        <p:txBody>
+          <a:bodyPr/>
+          <a:lstStyle/>
+          <a:p>
+            <a:r>
+              <a:rPr lang="en-US" dirty="0"/>
+              <a:t>Section 1 | Sidebar</a:t>
+            </a:r>
+          </a:p>
+        </p:txBody>
+      </p:sp>
+      <p:grpSp>
+        <p:nvGrpSpPr>
+          <p:cNvPr id="26" name="Group 25"/>
+          <p:cNvGrpSpPr/>
+          <p:nvPr/>
+        </p:nvGrpSpPr>
+        <p:grpSpPr>
+          <a:xfrm>
+            <a:off x="278130" y="3017520"/>
+            <a:ext cx="5600700" cy="2895600"/>
+            <a:chOff x="3295650" y="1981200"/>
+            <a:chExt cx="5600700" cy="2895600"/>
+          </a:xfrm>
+        </p:grpSpPr>
+        <p:pic>
+          <p:nvPicPr>
+            <p:cNvPr id="4" name="Picture 3"/>
+            <p:cNvPicPr>
+              <a:picLocks noChangeAspect="1"/>
+            </p:cNvPicPr>
+            <p:nvPr/>
+          </p:nvPicPr>
+          <p:blipFill>
+            <a:blip r:embed="rId2"/>
+            <a:stretch>
+              <a:fillRect/>
+            </a:stretch>
+          </p:blipFill>
+          <p:spPr>
+            <a:xfrm>
+              <a:off x="3295650" y="1981200"/>
+              <a:ext cx="5600700" cy="2895600"/>
+            </a:xfrm>
+            <a:prstGeom prst="rect">
+              <a:avLst/>
+            </a:prstGeom>
+          </p:spPr>
+        </p:pic>
+        <p:cxnSp>
+          <p:nvCxnSpPr>
+            <p:cNvPr id="9" name="Straight Arrow Connector 8"/>
+            <p:cNvCxnSpPr/>
+            <p:nvPr/>
+          </p:nvCxnSpPr>
+          <p:spPr>
+            <a:xfrm flipH="1">
+              <a:off x="5468887" y="2979350"/>
+              <a:ext cx="1200205" cy="0"/>
+            </a:xfrm>
+            <a:prstGeom prst="straightConnector1">
+              <a:avLst/>
+            </a:prstGeom>
+            <a:ln>
+              <a:tailEnd type="triangle"/>
+            </a:ln>
+          </p:spPr>
+          <p:style>
+            <a:lnRef idx="1">
+              <a:schemeClr val="accent1"/>
+            </a:lnRef>
+            <a:fillRef idx="0">
+              <a:schemeClr val="accent1"/>
+            </a:fillRef>
+            <a:effectRef idx="0">
+              <a:schemeClr val="accent1"/>
+            </a:effectRef>
+            <a:fontRef idx="minor">
+              <a:schemeClr val="tx1"/>
+            </a:fontRef>
+          </p:style>
+        </p:cxnSp>
+        <p:cxnSp>
+          <p:nvCxnSpPr>
+            <p:cNvPr id="11" name="Elbow Connector 10"/>
+            <p:cNvCxnSpPr>
+              <a:stCxn id="14" idx="1"/>
+            </p:cNvCxnSpPr>
+            <p:nvPr/>
+          </p:nvCxnSpPr>
+          <p:spPr>
+            <a:xfrm rot="10800000" flipV="1">
+              <a:off x="5077968" y="2253158"/>
+              <a:ext cx="916752" cy="221817"/>
+            </a:xfrm>
+            <a:prstGeom prst="bentConnector3">
+              <a:avLst>
+                <a:gd name="adj1" fmla="val 50000"/>
+              </a:avLst>
+            </a:prstGeom>
+            <a:ln>
+              <a:headEnd type="none" w="med" len="med"/>
+              <a:tailEnd type="triangle" w="med" len="med"/>
+            </a:ln>
+          </p:spPr>
+          <p:style>
+            <a:lnRef idx="1">
+              <a:schemeClr val="accent1"/>
+            </a:lnRef>
+            <a:fillRef idx="0">
+              <a:schemeClr val="accent1"/>
+            </a:fillRef>
+            <a:effectRef idx="0">
+              <a:schemeClr val="accent1"/>
+            </a:effectRef>
+            <a:fontRef idx="minor">
+              <a:schemeClr val="tx1"/>
+            </a:fontRef>
+          </p:style>
+        </p:cxnSp>
+        <p:sp>
+          <p:nvSpPr>
+            <p:cNvPr id="14" name="TextBox 13"/>
+            <p:cNvSpPr txBox="1"/>
+            <p:nvPr/>
+          </p:nvSpPr>
+          <p:spPr>
+            <a:xfrm>
+              <a:off x="5994720" y="2114659"/>
+              <a:ext cx="1356333" cy="276999"/>
+            </a:xfrm>
+            <a:prstGeom prst="rect">
+              <a:avLst/>
+            </a:prstGeom>
+            <a:noFill/>
+          </p:spPr>
+          <p:txBody>
+            <a:bodyPr wrap="none" rtlCol="0">
+              <a:spAutoFit/>
+            </a:bodyPr>
+            <a:lstStyle/>
+            <a:p>
+              <a:r>
+                <a:rPr lang="en-US" sz="1200" dirty="0"/>
+                <a:t>enable strict mode</a:t>
+              </a:r>
+            </a:p>
+          </p:txBody>
+        </p:sp>
+        <p:sp>
+          <p:nvSpPr>
+            <p:cNvPr id="15" name="TextBox 14"/>
+            <p:cNvSpPr txBox="1"/>
+            <p:nvPr/>
+          </p:nvSpPr>
+          <p:spPr>
+            <a:xfrm>
+              <a:off x="6793297" y="2680569"/>
+              <a:ext cx="1978848" cy="646331"/>
+            </a:xfrm>
+            <a:prstGeom prst="rect">
+              <a:avLst/>
+            </a:prstGeom>
+            <a:noFill/>
+          </p:spPr>
+          <p:txBody>
+            <a:bodyPr wrap="square" rtlCol="0">
+              <a:spAutoFit/>
+            </a:bodyPr>
+            <a:lstStyle/>
+            <a:p>
+              <a:r>
+                <a:rPr lang="en-US" sz="1200" dirty="0"/>
+                <a:t>in strict mode, an attempt to reassign a constant throws an error</a:t>
+              </a:r>
+            </a:p>
+          </p:txBody>
+        </p:sp>
+      </p:grpSp>
+      <p:pic>
+        <p:nvPicPr>
+          <p:cNvPr id="25" name="Picture 24"/>
+          <p:cNvPicPr>
+            <a:picLocks noChangeAspect="1"/>
+          </p:cNvPicPr>
+          <p:nvPr/>
+        </p:nvPicPr>
+        <p:blipFill rotWithShape="1">
+          <a:blip r:embed="rId3"/>
+          <a:srcRect r="5792"/>
+          <a:stretch/>
+        </p:blipFill>
+        <p:spPr>
+          <a:xfrm>
+            <a:off x="6398350" y="3017519"/>
+            <a:ext cx="5305970" cy="1927408"/>
+          </a:xfrm>
+          <a:prstGeom prst="rect">
+            <a:avLst/>
+          </a:prstGeom>
+        </p:spPr>
+      </p:pic>
+      <p:sp>
+        <p:nvSpPr>
+          <p:cNvPr id="27" name="Right Arrow 26"/>
+          <p:cNvSpPr/>
+          <p:nvPr/>
+        </p:nvSpPr>
+        <p:spPr>
+          <a:xfrm>
+            <a:off x="5806944" y="3816949"/>
+            <a:ext cx="663293" cy="328547"/>
+          </a:xfrm>
+          <a:prstGeom prst="rightArrow">
+            <a:avLst/>
+          </a:prstGeom>
+        </p:spPr>
+        <p:style>
+          <a:lnRef idx="3">
+            <a:schemeClr val="lt1"/>
+          </a:lnRef>
+          <a:fillRef idx="1">
+            <a:schemeClr val="accent1"/>
+          </a:fillRef>
+          <a:effectRef idx="1">
+            <a:schemeClr val="accent1"/>
+          </a:effectRef>
+          <a:fontRef idx="minor">
+            <a:schemeClr val="lt1"/>
+          </a:fontRef>
+        </p:style>
+        <p:txBody>
+          <a:bodyPr rtlCol="0" anchor="ctr"/>
+          <a:lstStyle/>
+          <a:p>
+            <a:pPr algn="ctr"/>
+            <a:endParaRPr lang="en-US"/>
+          </a:p>
+        </p:txBody>
+      </p:sp>
+      <p:sp>
+        <p:nvSpPr>
+          <p:cNvPr id="28" name="TextBox 27"/>
+          <p:cNvSpPr txBox="1"/>
+          <p:nvPr/>
+        </p:nvSpPr>
+        <p:spPr>
+          <a:xfrm>
+            <a:off x="6325937" y="5182407"/>
+            <a:ext cx="1978848" cy="646331"/>
+          </a:xfrm>
+          <a:prstGeom prst="rect">
+            <a:avLst/>
+          </a:prstGeom>
+          <a:noFill/>
+        </p:spPr>
+        <p:txBody>
+          <a:bodyPr wrap="square" rtlCol="0">
+            <a:spAutoFit/>
+          </a:bodyPr>
+          <a:lstStyle/>
+          <a:p>
+            <a:r>
+              <a:rPr lang="en-US" sz="1200" dirty="0"/>
+              <a:t>If strict mode isn’t enabled, the program will just ignore the reassignment.</a:t>
+            </a:r>
+          </a:p>
+        </p:txBody>
+      </p:sp>
+    </p:spTree>
+    <p:extLst>
+      <p:ext uri="{BB962C8B-B14F-4D97-AF65-F5344CB8AC3E}">
+        <p14:creationId xmlns:p14="http://schemas.microsoft.com/office/powerpoint/2010/main" val="1751395959"/>
+      </p:ext>
+    </p:extLst>
+  </p:cSld>
+  <p:clrMapOvr>
+    <a:masterClrMapping/>
+  </p:clrMapOvr>
+</p:sld>
+</file>
+
+<file path=ppt/slides/slide8.xml><?xml version="1.0" encoding="utf-8"?>
+<p:sld xmlns:a="http://schemas.openxmlformats.org/drawingml/2006/main" xmlns:r="http://schemas.openxmlformats.org/officeDocument/2006/relationships" xmlns:p="http://schemas.openxmlformats.org/presentationml/2006/main">
+  <p:cSld>
+    <p:spTree>
+      <p:nvGrpSpPr>
+        <p:cNvPr id="1" name=""/>
+        <p:cNvGrpSpPr/>
+        <p:nvPr/>
+      </p:nvGrpSpPr>
+      <p:grpSpPr>
+        <a:xfrm>
+          <a:off x="0" y="0"/>
+          <a:ext cx="0" cy="0"/>
+          <a:chOff x="0" y="0"/>
+          <a:chExt cx="0" cy="0"/>
+        </a:xfrm>
+      </p:grpSpPr>
+      <p:sp>
+        <p:nvSpPr>
+          <p:cNvPr id="2" name="Title 1"/>
+          <p:cNvSpPr>
+            <a:spLocks noGrp="1"/>
+          </p:cNvSpPr>
+          <p:nvPr>
+            <p:ph type="title"/>
+          </p:nvPr>
+        </p:nvSpPr>
+        <p:spPr/>
+        <p:txBody>
+          <a:bodyPr/>
+          <a:lstStyle/>
+          <a:p>
+            <a:r>
+              <a:rPr lang="en-US" dirty="0"/>
+              <a:t>Section 2 | Listing</a:t>
+            </a:r>
+          </a:p>
+        </p:txBody>
+      </p:sp>
+      <p:pic>
+        <p:nvPicPr>
+          <p:cNvPr id="4" name="Picture 3"/>
+          <p:cNvPicPr>
+            <a:picLocks noChangeAspect="1"/>
+          </p:cNvPicPr>
+          <p:nvPr/>
+        </p:nvPicPr>
+        <p:blipFill>
+          <a:blip r:embed="rId2"/>
+          <a:stretch>
+            <a:fillRect/>
+          </a:stretch>
+        </p:blipFill>
+        <p:spPr>
+          <a:xfrm>
+            <a:off x="4864101" y="2518833"/>
+            <a:ext cx="5953125" cy="1447800"/>
+          </a:xfrm>
+          <a:prstGeom prst="rect">
+            <a:avLst/>
+          </a:prstGeom>
+        </p:spPr>
+      </p:pic>
+    </p:spTree>
+    <p:extLst>
+      <p:ext uri="{BB962C8B-B14F-4D97-AF65-F5344CB8AC3E}">
+        <p14:creationId xmlns:p14="http://schemas.microsoft.com/office/powerpoint/2010/main" val="1318280234"/>
+      </p:ext>
+    </p:extLst>
+  </p:cSld>
+  <p:clrMapOvr>
+    <a:masterClrMapping/>
+  </p:clrMapOvr>
+</p:sld>
+</file>
+
+<file path=ppt/slides/slide9.xml><?xml version="1.0" encoding="utf-8"?>
+<p:sld xmlns:a="http://schemas.openxmlformats.org/drawingml/2006/main" xmlns:r="http://schemas.openxmlformats.org/officeDocument/2006/relationships" xmlns:p="http://schemas.openxmlformats.org/presentationml/2006/main">
+  <p:cSld>
+    <p:spTree>
+      <p:nvGrpSpPr>
+        <p:cNvPr id="1" name=""/>
+        <p:cNvGrpSpPr/>
+        <p:nvPr/>
+      </p:nvGrpSpPr>
+      <p:grpSpPr>
+        <a:xfrm>
+          <a:off x="0" y="0"/>
+          <a:ext cx="0" cy="0"/>
+          <a:chOff x="0" y="0"/>
+          <a:chExt cx="0" cy="0"/>
+        </a:xfrm>
+      </p:grpSpPr>
+      <p:pic>
+        <p:nvPicPr>
+          <p:cNvPr id="4" name="Picture 3"/>
+          <p:cNvPicPr>
+            <a:picLocks noChangeAspect="1"/>
+          </p:cNvPicPr>
+          <p:nvPr/>
+        </p:nvPicPr>
+        <p:blipFill>
+          <a:blip r:embed="rId2"/>
+          <a:stretch>
+            <a:fillRect/>
+          </a:stretch>
+        </p:blipFill>
+        <p:spPr>
+          <a:xfrm>
+            <a:off x="5289752" y="2357351"/>
+            <a:ext cx="6095593" cy="1981067"/>
+          </a:xfrm>
+          <a:prstGeom prst="roundRect">
+            <a:avLst>
+              <a:gd name="adj" fmla="val 4380"/>
+            </a:avLst>
+          </a:prstGeom>
+          <a:ln w="50800" cap="sq" cmpd="dbl">
+            <a:gradFill flip="none" rotWithShape="1">
+              <a:gsLst>
+                <a:gs pos="0">
+                  <a:srgbClr val="FFFFFF"/>
+                </a:gs>
+                <a:gs pos="100000">
+                  <a:schemeClr val="tx1">
+                    <a:alpha val="0"/>
+                  </a:schemeClr>
+                </a:gs>
+              </a:gsLst>
+              <a:path path="circle">
+                <a:fillToRect l="50000" t="50000" r="50000" b="50000"/>
+              </a:path>
+              <a:tileRect/>
+            </a:gradFill>
+            <a:miter lim="800000"/>
+          </a:ln>
+          <a:effectLst>
+            <a:outerShdw blurRad="254000" algn="tl" rotWithShape="0">
+              <a:srgbClr val="000000">
+                <a:alpha val="43000"/>
+              </a:srgbClr>
+            </a:outerShdw>
+          </a:effectLst>
+        </p:spPr>
+      </p:pic>
+      <p:sp>
+        <p:nvSpPr>
+          <p:cNvPr id="2" name="Title 1"/>
+          <p:cNvSpPr>
+            <a:spLocks noGrp="1"/>
+          </p:cNvSpPr>
+          <p:nvPr>
+            <p:ph type="title"/>
+          </p:nvPr>
+        </p:nvSpPr>
+        <p:spPr>
+          <a:xfrm>
+            <a:off x="825909" y="808055"/>
+            <a:ext cx="3979205" cy="1453363"/>
+          </a:xfrm>
+        </p:spPr>
+        <p:txBody>
+          <a:bodyPr>
+            <a:normAutofit/>
+          </a:bodyPr>
+          <a:lstStyle/>
+          <a:p>
+            <a:r>
+              <a:rPr lang="en-US" dirty="0"/>
+              <a:t>Section 3 | Listing</a:t>
+            </a:r>
+          </a:p>
+        </p:txBody>
+      </p:sp>
+      <p:sp>
+        <p:nvSpPr>
+          <p:cNvPr id="3" name="Content Placeholder 2"/>
+          <p:cNvSpPr>
+            <a:spLocks noGrp="1"/>
+          </p:cNvSpPr>
+          <p:nvPr>
+            <p:ph idx="1"/>
+          </p:nvPr>
+        </p:nvSpPr>
+        <p:spPr>
+          <a:xfrm>
+            <a:off x="802178" y="2261420"/>
+            <a:ext cx="4002936" cy="3637935"/>
+          </a:xfrm>
+        </p:spPr>
+        <p:txBody>
+          <a:bodyPr>
+            <a:normAutofit/>
+          </a:bodyPr>
+          <a:lstStyle/>
+          <a:p>
+            <a:pPr marL="0" indent="0">
+              <a:buNone/>
+            </a:pPr>
+            <a:r>
+              <a:rPr lang="en-US" dirty="0"/>
+              <a:t>We read each file separately, storing it to a variable. Then, we concatenate the data into our </a:t>
+            </a:r>
+            <a:r>
+              <a:rPr lang="en-US" i="1" dirty="0" err="1"/>
+              <a:t>consolidatedData</a:t>
+            </a:r>
+            <a:r>
+              <a:rPr lang="en-US" dirty="0"/>
+              <a:t> </a:t>
+            </a:r>
+            <a:r>
+              <a:rPr lang="en-US" i="1" dirty="0"/>
+              <a:t>. </a:t>
+            </a:r>
+            <a:r>
+              <a:rPr lang="en-US" dirty="0"/>
+              <a:t>Lastly, we write the new file. </a:t>
+            </a:r>
+          </a:p>
+        </p:txBody>
+      </p:sp>
+      <p:pic>
+        <p:nvPicPr>
+          <p:cNvPr id="5" name="Picture 4"/>
+          <p:cNvPicPr>
+            <a:picLocks noChangeAspect="1"/>
+          </p:cNvPicPr>
+          <p:nvPr/>
+        </p:nvPicPr>
+        <p:blipFill>
+          <a:blip r:embed="rId3"/>
+          <a:stretch>
+            <a:fillRect/>
+          </a:stretch>
+        </p:blipFill>
+        <p:spPr>
+          <a:xfrm>
+            <a:off x="4941401" y="106325"/>
+            <a:ext cx="6827266" cy="1999414"/>
+          </a:xfrm>
+          <a:prstGeom prst="rect">
+            <a:avLst/>
+          </a:prstGeom>
+        </p:spPr>
+      </p:pic>
+      <p:sp>
+        <p:nvSpPr>
+          <p:cNvPr id="6" name="TextBox 5"/>
+          <p:cNvSpPr txBox="1"/>
+          <p:nvPr/>
+        </p:nvSpPr>
+        <p:spPr>
+          <a:xfrm>
+            <a:off x="3009417" y="530395"/>
+            <a:ext cx="856325" cy="369332"/>
+          </a:xfrm>
+          <a:prstGeom prst="rect">
+            <a:avLst/>
+          </a:prstGeom>
+          <a:noFill/>
+        </p:spPr>
+        <p:txBody>
+          <a:bodyPr wrap="none" rtlCol="0">
+            <a:spAutoFit/>
+          </a:bodyPr>
+          <a:lstStyle/>
+          <a:p>
+            <a:r>
+              <a:rPr lang="en-US" dirty="0"/>
+              <a:t>Output</a:t>
+            </a:r>
+          </a:p>
+        </p:txBody>
+      </p:sp>
+      <p:sp>
+        <p:nvSpPr>
+          <p:cNvPr id="7" name="Right Arrow 6"/>
+          <p:cNvSpPr/>
+          <p:nvPr/>
+        </p:nvSpPr>
+        <p:spPr>
+          <a:xfrm>
+            <a:off x="4028946" y="609600"/>
+            <a:ext cx="625033" cy="290127"/>
+          </a:xfrm>
+          <a:prstGeom prst="rightArrow">
+            <a:avLst/>
+          </a:prstGeom>
+        </p:spPr>
+        <p:style>
+          <a:lnRef idx="2">
+            <a:schemeClr val="accent1">
+              <a:shade val="50000"/>
+            </a:schemeClr>
+          </a:lnRef>
+          <a:fillRef idx="1">
+            <a:schemeClr val="accent1"/>
+          </a:fillRef>
+          <a:effectRef idx="0">
+            <a:schemeClr val="accent1"/>
+          </a:effectRef>
+          <a:fontRef idx="minor">
+            <a:schemeClr val="lt1"/>
+          </a:fontRef>
+        </p:style>
+        <p:txBody>
+          <a:bodyPr rtlCol="0" anchor="ctr"/>
+          <a:lstStyle/>
+          <a:p>
+            <a:pPr algn="ctr"/>
+            <a:endParaRPr lang="en-US"/>
+          </a:p>
+        </p:txBody>
+      </p:sp>
+      <p:sp>
+        <p:nvSpPr>
+          <p:cNvPr id="8" name="Rectangle 7"/>
+          <p:cNvSpPr/>
+          <p:nvPr/>
+        </p:nvSpPr>
+        <p:spPr>
+          <a:xfrm>
+            <a:off x="4849792" y="899727"/>
+            <a:ext cx="7002684" cy="304040"/>
+          </a:xfrm>
+          <a:prstGeom prst="rect">
+            <a:avLst/>
+          </a:prstGeom>
+          <a:noFill/>
+          <a:ln>
+            <a:solidFill>
+              <a:srgbClr val="FF0000"/>
+            </a:solidFill>
+          </a:ln>
+        </p:spPr>
+        <p:style>
+          <a:lnRef idx="2">
+            <a:schemeClr val="accent1">
+              <a:shade val="50000"/>
+            </a:schemeClr>
+          </a:lnRef>
+          <a:fillRef idx="1">
+            <a:schemeClr val="accent1"/>
+          </a:fillRef>
+          <a:effectRef idx="0">
+            <a:schemeClr val="accent1"/>
+          </a:effectRef>
+          <a:fontRef idx="minor">
+            <a:schemeClr val="lt1"/>
+          </a:fontRef>
+        </p:style>
+        <p:txBody>
+          <a:bodyPr rtlCol="0" anchor="ctr"/>
+          <a:lstStyle/>
+          <a:p>
+            <a:pPr algn="ctr"/>
+            <a:endParaRPr lang="en-US"/>
+          </a:p>
+        </p:txBody>
+      </p:sp>
+      <p:sp>
+        <p:nvSpPr>
+          <p:cNvPr id="9" name="TextBox 8"/>
+          <p:cNvSpPr txBox="1"/>
+          <p:nvPr/>
+        </p:nvSpPr>
+        <p:spPr>
+          <a:xfrm>
+            <a:off x="340200" y="3519230"/>
+            <a:ext cx="4604803" cy="3139321"/>
+          </a:xfrm>
+          <a:prstGeom prst="rect">
+            <a:avLst/>
+          </a:prstGeom>
+          <a:solidFill>
+            <a:schemeClr val="bg2">
+              <a:lumMod val="50000"/>
+            </a:schemeClr>
+          </a:solidFill>
+          <a:ln>
+            <a:solidFill>
+              <a:schemeClr val="accent1">
+                <a:lumMod val="20000"/>
+                <a:lumOff val="80000"/>
+              </a:schemeClr>
+            </a:solidFill>
+          </a:ln>
+        </p:spPr>
+        <p:txBody>
+          <a:bodyPr wrap="square" lIns="182880" tIns="182880" rIns="182880" bIns="182880" rtlCol="0">
+            <a:spAutoFit/>
+          </a:bodyPr>
+          <a:lstStyle/>
+          <a:p>
+            <a:r>
+              <a:rPr lang="en-US" dirty="0"/>
+              <a:t>We’ve accomplished the task but this doesn’t really save us much in terms of effort. Importantly, we now know how to read and write individual files.</a:t>
+            </a:r>
+          </a:p>
+          <a:p>
+            <a:endParaRPr lang="en-US" dirty="0"/>
+          </a:p>
+          <a:p>
+            <a:r>
+              <a:rPr lang="en-US" dirty="0"/>
+              <a:t>Looking at our output, we see that we’ve concatenated the files. To make this output useable, we’d still have to remove the extra header rows tacked on when each file is joined. </a:t>
+            </a:r>
+          </a:p>
+        </p:txBody>
+      </p:sp>
+    </p:spTree>
+    <p:extLst>
+      <p:ext uri="{BB962C8B-B14F-4D97-AF65-F5344CB8AC3E}">
+        <p14:creationId xmlns:p14="http://schemas.microsoft.com/office/powerpoint/2010/main" val="419086698"/>
       </p:ext>
     </p:extLst>
   </p:cSld>

</xml_diff>